<commit_message>
Prior to merge with main
</commit_message>
<xml_diff>
--- a/companyxyz_presentation copy.pptx
+++ b/companyxyz_presentation copy.pptx
@@ -15,8 +15,8 @@
     <p:sldId id="272" r:id="rId9"/>
     <p:sldId id="277" r:id="rId10"/>
     <p:sldId id="258" r:id="rId11"/>
-    <p:sldId id="261" r:id="rId12"/>
-    <p:sldId id="262" r:id="rId13"/>
+    <p:sldId id="262" r:id="rId12"/>
+    <p:sldId id="261" r:id="rId13"/>
     <p:sldId id="263" r:id="rId14"/>
     <p:sldId id="264" r:id="rId15"/>
     <p:sldId id="265" r:id="rId16"/>
@@ -123,6 +123,11 @@
       </a:defRPr>
     </a:lvl9pPr>
   </p:defaultTextStyle>
+  <p:extLst>
+    <p:ext uri="{EFAFB233-063F-42B5-8137-9DF3F51BA10A}">
+      <p15:sldGuideLst xmlns:p15="http://schemas.microsoft.com/office/powerpoint/2012/main"/>
+    </p:ext>
+  </p:extLst>
 </p:presentation>
 </file>
 
@@ -273,7 +278,7 @@
           <a:p>
             <a:fld id="{81A2D996-68CB-CC46-8422-8E5E59C29E9C}" type="datetimeFigureOut">
               <a:rPr lang="en-US" smtClean="0"/>
-              <a:t>3/19/22</a:t>
+              <a:t>3/23/22</a:t>
             </a:fld>
             <a:endParaRPr lang="en-US"/>
           </a:p>
@@ -471,7 +476,7 @@
           <a:p>
             <a:fld id="{81A2D996-68CB-CC46-8422-8E5E59C29E9C}" type="datetimeFigureOut">
               <a:rPr lang="en-US" smtClean="0"/>
-              <a:t>3/19/22</a:t>
+              <a:t>3/23/22</a:t>
             </a:fld>
             <a:endParaRPr lang="en-US"/>
           </a:p>
@@ -679,7 +684,7 @@
           <a:p>
             <a:fld id="{81A2D996-68CB-CC46-8422-8E5E59C29E9C}" type="datetimeFigureOut">
               <a:rPr lang="en-US" smtClean="0"/>
-              <a:t>3/19/22</a:t>
+              <a:t>3/23/22</a:t>
             </a:fld>
             <a:endParaRPr lang="en-US"/>
           </a:p>
@@ -877,7 +882,7 @@
           <a:p>
             <a:fld id="{81A2D996-68CB-CC46-8422-8E5E59C29E9C}" type="datetimeFigureOut">
               <a:rPr lang="en-US" smtClean="0"/>
-              <a:t>3/19/22</a:t>
+              <a:t>3/23/22</a:t>
             </a:fld>
             <a:endParaRPr lang="en-US"/>
           </a:p>
@@ -1152,7 +1157,7 @@
           <a:p>
             <a:fld id="{81A2D996-68CB-CC46-8422-8E5E59C29E9C}" type="datetimeFigureOut">
               <a:rPr lang="en-US" smtClean="0"/>
-              <a:t>3/19/22</a:t>
+              <a:t>3/23/22</a:t>
             </a:fld>
             <a:endParaRPr lang="en-US"/>
           </a:p>
@@ -1417,7 +1422,7 @@
           <a:p>
             <a:fld id="{81A2D996-68CB-CC46-8422-8E5E59C29E9C}" type="datetimeFigureOut">
               <a:rPr lang="en-US" smtClean="0"/>
-              <a:t>3/19/22</a:t>
+              <a:t>3/23/22</a:t>
             </a:fld>
             <a:endParaRPr lang="en-US"/>
           </a:p>
@@ -1829,7 +1834,7 @@
           <a:p>
             <a:fld id="{81A2D996-68CB-CC46-8422-8E5E59C29E9C}" type="datetimeFigureOut">
               <a:rPr lang="en-US" smtClean="0"/>
-              <a:t>3/19/22</a:t>
+              <a:t>3/23/22</a:t>
             </a:fld>
             <a:endParaRPr lang="en-US"/>
           </a:p>
@@ -1970,7 +1975,7 @@
           <a:p>
             <a:fld id="{81A2D996-68CB-CC46-8422-8E5E59C29E9C}" type="datetimeFigureOut">
               <a:rPr lang="en-US" smtClean="0"/>
-              <a:t>3/19/22</a:t>
+              <a:t>3/23/22</a:t>
             </a:fld>
             <a:endParaRPr lang="en-US"/>
           </a:p>
@@ -2083,7 +2088,7 @@
           <a:p>
             <a:fld id="{81A2D996-68CB-CC46-8422-8E5E59C29E9C}" type="datetimeFigureOut">
               <a:rPr lang="en-US" smtClean="0"/>
-              <a:t>3/19/22</a:t>
+              <a:t>3/23/22</a:t>
             </a:fld>
             <a:endParaRPr lang="en-US"/>
           </a:p>
@@ -2394,7 +2399,7 @@
           <a:p>
             <a:fld id="{81A2D996-68CB-CC46-8422-8E5E59C29E9C}" type="datetimeFigureOut">
               <a:rPr lang="en-US" smtClean="0"/>
-              <a:t>3/19/22</a:t>
+              <a:t>3/23/22</a:t>
             </a:fld>
             <a:endParaRPr lang="en-US"/>
           </a:p>
@@ -2682,7 +2687,7 @@
           <a:p>
             <a:fld id="{81A2D996-68CB-CC46-8422-8E5E59C29E9C}" type="datetimeFigureOut">
               <a:rPr lang="en-US" smtClean="0"/>
-              <a:t>3/19/22</a:t>
+              <a:t>3/23/22</a:t>
             </a:fld>
             <a:endParaRPr lang="en-US"/>
           </a:p>
@@ -2923,7 +2928,7 @@
           <a:p>
             <a:fld id="{81A2D996-68CB-CC46-8422-8E5E59C29E9C}" type="datetimeFigureOut">
               <a:rPr lang="en-US" smtClean="0"/>
-              <a:t>3/19/22</a:t>
+              <a:t>3/23/22</a:t>
             </a:fld>
             <a:endParaRPr lang="en-US"/>
           </a:p>
@@ -3458,8 +3463,8 @@
         </p:nvSpPr>
         <p:spPr>
           <a:xfrm>
-            <a:off x="8394700" y="823092"/>
-            <a:ext cx="3429438" cy="4682357"/>
+            <a:off x="8394700" y="1620577"/>
+            <a:ext cx="3429438" cy="3620143"/>
           </a:xfrm>
         </p:spPr>
         <p:txBody>
@@ -3477,32 +3482,7 @@
                   <a:srgbClr val="FF0000"/>
                 </a:solidFill>
               </a:rPr>
-              <a:t>Below Average Purchases, Above Average Spend:</a:t>
-            </a:r>
-          </a:p>
-          <a:p>
-            <a:r>
-              <a:rPr lang="en-US" sz="1400" dirty="0" err="1">
-                <a:solidFill>
-                  <a:srgbClr val="FF0000"/>
-                </a:solidFill>
-              </a:rPr>
-              <a:t>ZeeTV</a:t>
-            </a:r>
-            <a:endParaRPr lang="en-US" sz="1400" dirty="0">
-              <a:solidFill>
-                <a:srgbClr val="FF0000"/>
-              </a:solidFill>
-            </a:endParaRPr>
-          </a:p>
-          <a:p>
-            <a:r>
-              <a:rPr lang="en-US" sz="1400" dirty="0">
-                <a:solidFill>
-                  <a:srgbClr val="FF0000"/>
-                </a:solidFill>
-              </a:rPr>
-              <a:t>Star Plus</a:t>
+              <a:t>Below average purchases, above average spend:</a:t>
             </a:r>
           </a:p>
           <a:p>
@@ -3532,33 +3512,23 @@
             <a:pPr marL="0" indent="0">
               <a:buNone/>
             </a:pPr>
+            <a:endParaRPr lang="en-US" sz="1900" dirty="0">
+              <a:solidFill>
+                <a:srgbClr val="FF0000"/>
+              </a:solidFill>
+            </a:endParaRPr>
+          </a:p>
+          <a:p>
+            <a:pPr marL="0" indent="0">
+              <a:buNone/>
+            </a:pPr>
             <a:r>
               <a:rPr lang="en-US" sz="1900" dirty="0">
                 <a:solidFill>
                   <a:srgbClr val="00B050"/>
                 </a:solidFill>
               </a:rPr>
-              <a:t>Above Average Purchases, Below Average Spend: Good!</a:t>
-            </a:r>
-          </a:p>
-          <a:p>
-            <a:r>
-              <a:rPr lang="en-US" sz="1400" dirty="0">
-                <a:solidFill>
-                  <a:srgbClr val="00B050"/>
-                </a:solidFill>
-              </a:rPr>
-              <a:t>MSNBC</a:t>
-            </a:r>
-          </a:p>
-          <a:p>
-            <a:r>
-              <a:rPr lang="en-US" sz="1400" dirty="0">
-                <a:solidFill>
-                  <a:srgbClr val="00B050"/>
-                </a:solidFill>
-              </a:rPr>
-              <a:t>CNBC</a:t>
+              <a:t>Above average purchases, below average spend:</a:t>
             </a:r>
           </a:p>
           <a:p>
@@ -3581,12 +3551,47 @@
           </a:p>
         </p:txBody>
       </p:sp>
+      <p:sp>
+        <p:nvSpPr>
+          <p:cNvPr id="7" name="TextBox 6">
+            <a:extLst>
+              <a:ext uri="{FF2B5EF4-FFF2-40B4-BE49-F238E27FC236}">
+                <a16:creationId xmlns:a16="http://schemas.microsoft.com/office/drawing/2014/main" id="{E663F7EC-50CA-8949-81C9-9FB4F5610FE4}"/>
+              </a:ext>
+            </a:extLst>
+          </p:cNvPr>
+          <p:cNvSpPr txBox="1"/>
+          <p:nvPr/>
+        </p:nvSpPr>
+        <p:spPr>
+          <a:xfrm>
+            <a:off x="0" y="6488668"/>
+            <a:ext cx="11824138" cy="369332"/>
+          </a:xfrm>
+          <a:prstGeom prst="rect">
+            <a:avLst/>
+          </a:prstGeom>
+          <a:noFill/>
+        </p:spPr>
+        <p:txBody>
+          <a:bodyPr wrap="square" rtlCol="0">
+            <a:spAutoFit/>
+          </a:bodyPr>
+          <a:lstStyle/>
+          <a:p>
+            <a:r>
+              <a:rPr lang="en-US" dirty="0"/>
+              <a:t>Note: the graph is divided into four quadrants, sectioned off by Average Purchases (x) and Average Spend (y).</a:t>
+            </a:r>
+          </a:p>
+        </p:txBody>
+      </p:sp>
       <p:pic>
         <p:nvPicPr>
-          <p:cNvPr id="6" name="Picture 5">
-            <a:extLst>
-              <a:ext uri="{FF2B5EF4-FFF2-40B4-BE49-F238E27FC236}">
-                <a16:creationId xmlns:a16="http://schemas.microsoft.com/office/drawing/2014/main" id="{56D74F69-8320-0B4F-BFC4-43765BEB98C4}"/>
+          <p:cNvPr id="5" name="Picture 4">
+            <a:extLst>
+              <a:ext uri="{FF2B5EF4-FFF2-40B4-BE49-F238E27FC236}">
+                <a16:creationId xmlns:a16="http://schemas.microsoft.com/office/drawing/2014/main" id="{7E4AC08E-410A-BD4D-85CB-D666FA54BDCB}"/>
               </a:ext>
             </a:extLst>
           </p:cNvPr>
@@ -3611,41 +3616,6 @@
           </a:prstGeom>
         </p:spPr>
       </p:pic>
-      <p:sp>
-        <p:nvSpPr>
-          <p:cNvPr id="7" name="TextBox 6">
-            <a:extLst>
-              <a:ext uri="{FF2B5EF4-FFF2-40B4-BE49-F238E27FC236}">
-                <a16:creationId xmlns:a16="http://schemas.microsoft.com/office/drawing/2014/main" id="{E663F7EC-50CA-8949-81C9-9FB4F5610FE4}"/>
-              </a:ext>
-            </a:extLst>
-          </p:cNvPr>
-          <p:cNvSpPr txBox="1"/>
-          <p:nvPr/>
-        </p:nvSpPr>
-        <p:spPr>
-          <a:xfrm>
-            <a:off x="0" y="6488668"/>
-            <a:ext cx="10265503" cy="369332"/>
-          </a:xfrm>
-          <a:prstGeom prst="rect">
-            <a:avLst/>
-          </a:prstGeom>
-          <a:noFill/>
-        </p:spPr>
-        <p:txBody>
-          <a:bodyPr wrap="none" rtlCol="0">
-            <a:spAutoFit/>
-          </a:bodyPr>
-          <a:lstStyle/>
-          <a:p>
-            <a:r>
-              <a:rPr lang="en-US" dirty="0"/>
-              <a:t>Note: the graph is divided into four quadrants, sectioned off by Average Purchases (x) and Average Spend (y)</a:t>
-            </a:r>
-          </a:p>
-        </p:txBody>
-      </p:sp>
     </p:spTree>
     <p:extLst>
       <p:ext uri="{BB962C8B-B14F-4D97-AF65-F5344CB8AC3E}">
@@ -3681,7 +3651,7 @@
           <p:cNvPr id="2" name="Title 1">
             <a:extLst>
               <a:ext uri="{FF2B5EF4-FFF2-40B4-BE49-F238E27FC236}">
-                <a16:creationId xmlns:a16="http://schemas.microsoft.com/office/drawing/2014/main" id="{78C47F35-7B4E-F44F-8191-10ED879876E7}"/>
+                <a16:creationId xmlns:a16="http://schemas.microsoft.com/office/drawing/2014/main" id="{756035B6-3D83-594C-9C53-BA63DA32DA86}"/>
               </a:ext>
             </a:extLst>
           </p:cNvPr>
@@ -3694,8 +3664,8 @@
         </p:nvSpPr>
         <p:spPr>
           <a:xfrm>
-            <a:off x="763095" y="365125"/>
-            <a:ext cx="3434255" cy="987425"/>
+            <a:off x="449755" y="502541"/>
+            <a:ext cx="4056555" cy="730250"/>
           </a:xfrm>
         </p:spPr>
         <p:txBody>
@@ -3706,17 +3676,17 @@
           <a:p>
             <a:r>
               <a:rPr lang="en-US" sz="3400" u="sng" dirty="0"/>
-              <a:t>Lift vs. Spend</a:t>
+              <a:t>Lift vs. Purchases</a:t>
             </a:r>
           </a:p>
         </p:txBody>
       </p:sp>
       <p:pic>
         <p:nvPicPr>
-          <p:cNvPr id="5" name="Picture 4">
-            <a:extLst>
-              <a:ext uri="{FF2B5EF4-FFF2-40B4-BE49-F238E27FC236}">
-                <a16:creationId xmlns:a16="http://schemas.microsoft.com/office/drawing/2014/main" id="{BB3965A8-12C3-DB4B-BDEF-5D2E4B2216C4}"/>
+          <p:cNvPr id="7" name="Picture 6">
+            <a:extLst>
+              <a:ext uri="{FF2B5EF4-FFF2-40B4-BE49-F238E27FC236}">
+                <a16:creationId xmlns:a16="http://schemas.microsoft.com/office/drawing/2014/main" id="{200AF6D5-33E1-A54B-97B0-A59877B0A1F6}"/>
               </a:ext>
             </a:extLst>
           </p:cNvPr>
@@ -3734,7 +3704,7 @@
         <p:spPr>
           <a:xfrm>
             <a:off x="0" y="1352550"/>
-            <a:ext cx="8394700" cy="4152900"/>
+            <a:ext cx="8318500" cy="4152900"/>
           </a:xfrm>
           <a:prstGeom prst="rect">
             <a:avLst/>
@@ -3743,10 +3713,10 @@
       </p:pic>
       <p:sp>
         <p:nvSpPr>
-          <p:cNvPr id="6" name="TextBox 5">
-            <a:extLst>
-              <a:ext uri="{FF2B5EF4-FFF2-40B4-BE49-F238E27FC236}">
-                <a16:creationId xmlns:a16="http://schemas.microsoft.com/office/drawing/2014/main" id="{53F78831-0B9E-884A-8048-B2838C936155}"/>
+          <p:cNvPr id="8" name="TextBox 7">
+            <a:extLst>
+              <a:ext uri="{FF2B5EF4-FFF2-40B4-BE49-F238E27FC236}">
+                <a16:creationId xmlns:a16="http://schemas.microsoft.com/office/drawing/2014/main" id="{C007679F-A092-FD40-A2A5-5E16866D5F92}"/>
               </a:ext>
             </a:extLst>
           </p:cNvPr>
@@ -3756,7 +3726,7 @@
         <p:spPr>
           <a:xfrm>
             <a:off x="0" y="6488668"/>
-            <a:ext cx="9614876" cy="369332"/>
+            <a:ext cx="10105202" cy="369332"/>
           </a:xfrm>
           <a:prstGeom prst="rect">
             <a:avLst/>
@@ -3771,17 +3741,17 @@
           <a:p>
             <a:r>
               <a:rPr lang="en-US" dirty="0"/>
-              <a:t>Note: the graph is divided into four quadrants, sectioned off by Average Lift (x) and Average Spend (y)</a:t>
-            </a:r>
-          </a:p>
-        </p:txBody>
-      </p:sp>
-      <p:sp>
-        <p:nvSpPr>
-          <p:cNvPr id="7" name="Content Placeholder 2">
-            <a:extLst>
-              <a:ext uri="{FF2B5EF4-FFF2-40B4-BE49-F238E27FC236}">
-                <a16:creationId xmlns:a16="http://schemas.microsoft.com/office/drawing/2014/main" id="{2E1B6FAF-DC51-234F-935C-E1704FB44E20}"/>
+              <a:t>Note: the graph is divided into four quadrants, sectioned off by Average Lift (x) and Average Purchases (y)</a:t>
+            </a:r>
+          </a:p>
+        </p:txBody>
+      </p:sp>
+      <p:sp>
+        <p:nvSpPr>
+          <p:cNvPr id="9" name="Content Placeholder 2">
+            <a:extLst>
+              <a:ext uri="{FF2B5EF4-FFF2-40B4-BE49-F238E27FC236}">
+                <a16:creationId xmlns:a16="http://schemas.microsoft.com/office/drawing/2014/main" id="{EAC6F2EE-E8AF-4644-B28C-7A46F8948265}"/>
               </a:ext>
             </a:extLst>
           </p:cNvPr>
@@ -3792,8 +3762,8 @@
         </p:nvSpPr>
         <p:spPr>
           <a:xfrm>
-            <a:off x="8394700" y="1087821"/>
-            <a:ext cx="3429438" cy="4682357"/>
+            <a:off x="8318500" y="1562421"/>
+            <a:ext cx="3429438" cy="3733158"/>
           </a:xfrm>
           <a:prstGeom prst="rect">
             <a:avLst/>
@@ -3974,21 +3944,44 @@
             <a:r>
               <a:rPr lang="en-US" sz="1900" dirty="0">
                 <a:solidFill>
-                  <a:srgbClr val="FF0000"/>
+                  <a:srgbClr val="00B050"/>
                 </a:solidFill>
               </a:rPr>
-              <a:t>Below Average Lift, Above Average Spend:</a:t>
-            </a:r>
-          </a:p>
-          <a:p>
-            <a:r>
-              <a:rPr lang="en-US" sz="1400" dirty="0">
+              <a:t>Below average lift, yet above average purchases: </a:t>
+            </a:r>
+          </a:p>
+          <a:p>
+            <a:pPr marL="0" indent="0">
+              <a:buNone/>
+            </a:pPr>
+            <a:r>
+              <a:rPr lang="en-US" sz="1900" dirty="0">
                 <a:solidFill>
-                  <a:srgbClr val="FF0000"/>
+                  <a:srgbClr val="00B050"/>
                 </a:solidFill>
               </a:rPr>
-              <a:t>Dateline</a:t>
-            </a:r>
+              <a:t>You’re getting less lift, but more purchases despite it, that’s good!</a:t>
+            </a:r>
+          </a:p>
+          <a:p>
+            <a:pPr marL="0" indent="0">
+              <a:buNone/>
+            </a:pPr>
+            <a:endParaRPr lang="en-US" sz="1900" dirty="0">
+              <a:solidFill>
+                <a:srgbClr val="FF0000"/>
+              </a:solidFill>
+            </a:endParaRPr>
+          </a:p>
+          <a:p>
+            <a:pPr marL="0" indent="0">
+              <a:buNone/>
+            </a:pPr>
+            <a:endParaRPr lang="en-US" sz="1900" dirty="0">
+              <a:solidFill>
+                <a:srgbClr val="FF0000"/>
+              </a:solidFill>
+            </a:endParaRPr>
           </a:p>
           <a:p>
             <a:pPr marL="0" indent="0">
@@ -4000,28 +3993,8 @@
                   <a:srgbClr val="FF0000"/>
                 </a:solidFill>
               </a:rPr>
-              <a:t>You’re getting less lift for your buck, that’s bad!</a:t>
-            </a:r>
-          </a:p>
-          <a:p>
-            <a:pPr marL="0" indent="0">
-              <a:buNone/>
-            </a:pPr>
-            <a:endParaRPr lang="en-US" sz="1900" dirty="0">
-              <a:solidFill>
-                <a:srgbClr val="00B050"/>
-              </a:solidFill>
-            </a:endParaRPr>
-          </a:p>
-          <a:p>
-            <a:pPr marL="0" indent="0">
-              <a:buNone/>
-            </a:pPr>
-            <a:endParaRPr lang="en-US" sz="1900" dirty="0">
-              <a:solidFill>
-                <a:srgbClr val="00B050"/>
-              </a:solidFill>
-            </a:endParaRPr>
+              <a:t>Above average lift, below average purchases:</a:t>
+            </a:r>
           </a:p>
           <a:p>
             <a:pPr marL="0" indent="0">
@@ -4030,43 +4003,10 @@
             <a:r>
               <a:rPr lang="en-US" sz="1900" dirty="0">
                 <a:solidFill>
-                  <a:srgbClr val="00B050"/>
+                  <a:srgbClr val="FF0000"/>
                 </a:solidFill>
               </a:rPr>
-              <a:t>Above Average Lift, Below Average Spend: Good!</a:t>
-            </a:r>
-          </a:p>
-          <a:p>
-            <a:r>
-              <a:rPr lang="en-US" sz="1400" dirty="0">
-                <a:solidFill>
-                  <a:srgbClr val="00B050"/>
-                </a:solidFill>
-              </a:rPr>
-              <a:t>MSNBC</a:t>
-            </a:r>
-          </a:p>
-          <a:p>
-            <a:r>
-              <a:rPr lang="en-US" sz="1400" dirty="0">
-                <a:solidFill>
-                  <a:srgbClr val="00B050"/>
-                </a:solidFill>
-              </a:rPr>
-              <a:t>Dish Network</a:t>
-            </a:r>
-          </a:p>
-          <a:p>
-            <a:pPr marL="0" indent="0">
-              <a:buNone/>
-            </a:pPr>
-            <a:r>
-              <a:rPr lang="en-US" sz="1900" dirty="0">
-                <a:solidFill>
-                  <a:srgbClr val="00B050"/>
-                </a:solidFill>
-              </a:rPr>
-              <a:t>You’re getting more lift for your buck, that’s good!</a:t>
+              <a:t>Despite increased traffic, these customers don’t seem to want your product, that’s bad!</a:t>
             </a:r>
           </a:p>
         </p:txBody>
@@ -4074,7 +4014,7 @@
     </p:spTree>
     <p:extLst>
       <p:ext uri="{BB962C8B-B14F-4D97-AF65-F5344CB8AC3E}">
-        <p14:creationId xmlns:p14="http://schemas.microsoft.com/office/powerpoint/2010/main" val="1212188149"/>
+        <p14:creationId xmlns:p14="http://schemas.microsoft.com/office/powerpoint/2010/main" val="2172144522"/>
       </p:ext>
     </p:extLst>
   </p:cSld>
@@ -4106,7 +4046,7 @@
           <p:cNvPr id="2" name="Title 1">
             <a:extLst>
               <a:ext uri="{FF2B5EF4-FFF2-40B4-BE49-F238E27FC236}">
-                <a16:creationId xmlns:a16="http://schemas.microsoft.com/office/drawing/2014/main" id="{756035B6-3D83-594C-9C53-BA63DA32DA86}"/>
+                <a16:creationId xmlns:a16="http://schemas.microsoft.com/office/drawing/2014/main" id="{78C47F35-7B4E-F44F-8191-10ED879876E7}"/>
               </a:ext>
             </a:extLst>
           </p:cNvPr>
@@ -4119,8 +4059,8 @@
         </p:nvSpPr>
         <p:spPr>
           <a:xfrm>
-            <a:off x="449755" y="502541"/>
-            <a:ext cx="4056555" cy="730250"/>
+            <a:off x="763095" y="365125"/>
+            <a:ext cx="3434255" cy="987425"/>
           </a:xfrm>
         </p:spPr>
         <p:txBody>
@@ -4131,57 +4071,27 @@
           <a:p>
             <a:r>
               <a:rPr lang="en-US" sz="3400" u="sng" dirty="0"/>
-              <a:t>Lift vs. Purchases</a:t>
-            </a:r>
-          </a:p>
-        </p:txBody>
-      </p:sp>
-      <p:pic>
-        <p:nvPicPr>
-          <p:cNvPr id="7" name="Picture 6">
-            <a:extLst>
-              <a:ext uri="{FF2B5EF4-FFF2-40B4-BE49-F238E27FC236}">
-                <a16:creationId xmlns:a16="http://schemas.microsoft.com/office/drawing/2014/main" id="{200AF6D5-33E1-A54B-97B0-A59877B0A1F6}"/>
-              </a:ext>
-            </a:extLst>
-          </p:cNvPr>
-          <p:cNvPicPr>
-            <a:picLocks noChangeAspect="1"/>
-          </p:cNvPicPr>
+              <a:t>Lift vs. Spend</a:t>
+            </a:r>
+          </a:p>
+        </p:txBody>
+      </p:sp>
+      <p:sp>
+        <p:nvSpPr>
+          <p:cNvPr id="6" name="TextBox 5">
+            <a:extLst>
+              <a:ext uri="{FF2B5EF4-FFF2-40B4-BE49-F238E27FC236}">
+                <a16:creationId xmlns:a16="http://schemas.microsoft.com/office/drawing/2014/main" id="{53F78831-0B9E-884A-8048-B2838C936155}"/>
+              </a:ext>
+            </a:extLst>
+          </p:cNvPr>
+          <p:cNvSpPr txBox="1"/>
           <p:nvPr/>
-        </p:nvPicPr>
-        <p:blipFill>
-          <a:blip r:embed="rId2"/>
-          <a:stretch>
-            <a:fillRect/>
-          </a:stretch>
-        </p:blipFill>
+        </p:nvSpPr>
         <p:spPr>
           <a:xfrm>
-            <a:off x="0" y="1352550"/>
-            <a:ext cx="8318500" cy="4152900"/>
-          </a:xfrm>
-          <a:prstGeom prst="rect">
-            <a:avLst/>
-          </a:prstGeom>
-        </p:spPr>
-      </p:pic>
-      <p:sp>
-        <p:nvSpPr>
-          <p:cNvPr id="8" name="TextBox 7">
-            <a:extLst>
-              <a:ext uri="{FF2B5EF4-FFF2-40B4-BE49-F238E27FC236}">
-                <a16:creationId xmlns:a16="http://schemas.microsoft.com/office/drawing/2014/main" id="{C007679F-A092-FD40-A2A5-5E16866D5F92}"/>
-              </a:ext>
-            </a:extLst>
-          </p:cNvPr>
-          <p:cNvSpPr txBox="1"/>
-          <p:nvPr/>
-        </p:nvSpPr>
-        <p:spPr>
-          <a:xfrm>
-            <a:off x="0" y="6488668"/>
-            <a:ext cx="9957726" cy="369332"/>
+            <a:off x="0" y="6223818"/>
+            <a:ext cx="10849510" cy="646331"/>
           </a:xfrm>
           <a:prstGeom prst="rect">
             <a:avLst/>
@@ -4189,24 +4099,24 @@
           <a:noFill/>
         </p:spPr>
         <p:txBody>
-          <a:bodyPr wrap="none" rtlCol="0">
+          <a:bodyPr wrap="square" rtlCol="0">
             <a:spAutoFit/>
           </a:bodyPr>
           <a:lstStyle/>
           <a:p>
             <a:r>
               <a:rPr lang="en-US" dirty="0"/>
-              <a:t>Note: the graph is divided into four quadrants, sectioned off by Average Lift (x) and Average Purchases (y)</a:t>
-            </a:r>
-          </a:p>
-        </p:txBody>
-      </p:sp>
-      <p:sp>
-        <p:nvSpPr>
-          <p:cNvPr id="9" name="Content Placeholder 2">
-            <a:extLst>
-              <a:ext uri="{FF2B5EF4-FFF2-40B4-BE49-F238E27FC236}">
-                <a16:creationId xmlns:a16="http://schemas.microsoft.com/office/drawing/2014/main" id="{EAC6F2EE-E8AF-4644-B28C-7A46F8948265}"/>
+              <a:t>Note: the graph is divided into four quadrants, sectioned off by Average Lift (x) and Average Spend (y). The size of each colored point corresponds to number of purchases made there.</a:t>
+            </a:r>
+          </a:p>
+        </p:txBody>
+      </p:sp>
+      <p:sp>
+        <p:nvSpPr>
+          <p:cNvPr id="7" name="Content Placeholder 2">
+            <a:extLst>
+              <a:ext uri="{FF2B5EF4-FFF2-40B4-BE49-F238E27FC236}">
+                <a16:creationId xmlns:a16="http://schemas.microsoft.com/office/drawing/2014/main" id="{2E1B6FAF-DC51-234F-935C-E1704FB44E20}"/>
               </a:ext>
             </a:extLst>
           </p:cNvPr>
@@ -4217,8 +4127,8 @@
         </p:nvSpPr>
         <p:spPr>
           <a:xfrm>
-            <a:off x="8318500" y="1087821"/>
-            <a:ext cx="3429438" cy="4682357"/>
+            <a:off x="8394700" y="1484914"/>
+            <a:ext cx="3429438" cy="3888172"/>
           </a:xfrm>
           <a:prstGeom prst="rect">
             <a:avLst/>
@@ -4399,31 +4309,54 @@
             <a:r>
               <a:rPr lang="en-US" sz="1900" dirty="0">
                 <a:solidFill>
-                  <a:srgbClr val="00B050"/>
+                  <a:srgbClr val="FF0000"/>
                 </a:solidFill>
               </a:rPr>
-              <a:t>Below Average Lift, yet Above Average Purchases: Good!</a:t>
-            </a:r>
-          </a:p>
-          <a:p>
-            <a:r>
-              <a:rPr lang="en-US" sz="1400" dirty="0">
+              <a:t>Below average lift, above average spend:</a:t>
+            </a:r>
+          </a:p>
+          <a:p>
+            <a:pPr marL="0" indent="0">
+              <a:buNone/>
+            </a:pPr>
+            <a:r>
+              <a:rPr lang="en-US" sz="1900" dirty="0">
                 <a:solidFill>
-                  <a:srgbClr val="00B050"/>
+                  <a:srgbClr val="FF0000"/>
                 </a:solidFill>
               </a:rPr>
-              <a:t>CNBC</a:t>
-            </a:r>
-          </a:p>
-          <a:p>
-            <a:r>
-              <a:rPr lang="en-US" sz="1400" dirty="0">
-                <a:solidFill>
-                  <a:srgbClr val="00B050"/>
-                </a:solidFill>
-              </a:rPr>
-              <a:t>Dateline</a:t>
-            </a:r>
+              <a:t>You’re getting less lift for your buck, that’s bad!</a:t>
+            </a:r>
+          </a:p>
+          <a:p>
+            <a:pPr marL="0" indent="0">
+              <a:buNone/>
+            </a:pPr>
+            <a:endParaRPr lang="en-US" sz="1900" dirty="0">
+              <a:solidFill>
+                <a:srgbClr val="00B050"/>
+              </a:solidFill>
+            </a:endParaRPr>
+          </a:p>
+          <a:p>
+            <a:pPr marL="0" indent="0">
+              <a:buNone/>
+            </a:pPr>
+            <a:endParaRPr lang="en-US" sz="1900" dirty="0">
+              <a:solidFill>
+                <a:srgbClr val="00B050"/>
+              </a:solidFill>
+            </a:endParaRPr>
+          </a:p>
+          <a:p>
+            <a:pPr marL="0" indent="0">
+              <a:buNone/>
+            </a:pPr>
+            <a:endParaRPr lang="en-US" sz="1900" dirty="0">
+              <a:solidFill>
+                <a:srgbClr val="00B050"/>
+              </a:solidFill>
+            </a:endParaRPr>
           </a:p>
           <a:p>
             <a:pPr marL="0" indent="0">
@@ -4435,7 +4368,7 @@
                   <a:srgbClr val="00B050"/>
                 </a:solidFill>
               </a:rPr>
-              <a:t>You’re getting less lift, but more purchases despite it, that’s good!</a:t>
+              <a:t>Above average lift, below average spend: </a:t>
             </a:r>
           </a:p>
           <a:p>
@@ -4445,76 +4378,48 @@
             <a:r>
               <a:rPr lang="en-US" sz="1900" dirty="0">
                 <a:solidFill>
-                  <a:srgbClr val="FF0000"/>
+                  <a:srgbClr val="00B050"/>
                 </a:solidFill>
               </a:rPr>
-              <a:t>Above Average Lift, Below Average Purchases: Bad!  </a:t>
-            </a:r>
-          </a:p>
-          <a:p>
-            <a:r>
-              <a:rPr lang="en-US" sz="1400" dirty="0" err="1">
-                <a:solidFill>
-                  <a:srgbClr val="FF0000"/>
-                </a:solidFill>
-              </a:rPr>
-              <a:t>ZeeTV</a:t>
-            </a:r>
-            <a:endParaRPr lang="en-US" sz="1400" dirty="0">
-              <a:solidFill>
-                <a:srgbClr val="FF0000"/>
-              </a:solidFill>
-            </a:endParaRPr>
-          </a:p>
-          <a:p>
-            <a:r>
-              <a:rPr lang="en-US" sz="1400" dirty="0">
-                <a:solidFill>
-                  <a:srgbClr val="FF0000"/>
-                </a:solidFill>
-              </a:rPr>
-              <a:t>Star Plus</a:t>
-            </a:r>
-          </a:p>
-          <a:p>
-            <a:r>
-              <a:rPr lang="en-US" sz="1400" dirty="0">
-                <a:solidFill>
-                  <a:srgbClr val="FF0000"/>
-                </a:solidFill>
-              </a:rPr>
-              <a:t>Dish Network</a:t>
-            </a:r>
-          </a:p>
-          <a:p>
-            <a:pPr marL="0" indent="0">
-              <a:buNone/>
-            </a:pPr>
-            <a:r>
-              <a:rPr lang="en-US" sz="1900" dirty="0">
-                <a:solidFill>
-                  <a:srgbClr val="FF0000"/>
-                </a:solidFill>
-              </a:rPr>
-              <a:t>Despite increased traffic, these customers don’t seem to want your product, that’s bad!</a:t>
-            </a:r>
-          </a:p>
-          <a:p>
-            <a:pPr marL="0" indent="0">
-              <a:buNone/>
-            </a:pPr>
-            <a:endParaRPr lang="en-US" sz="1900" dirty="0">
-              <a:solidFill>
-                <a:srgbClr val="FF0000"/>
-              </a:solidFill>
-            </a:endParaRPr>
-          </a:p>
-        </p:txBody>
-      </p:sp>
+              <a:t>You’re getting more lift for your buck, that’s good!</a:t>
+            </a:r>
+          </a:p>
+        </p:txBody>
+      </p:sp>
+      <p:pic>
+        <p:nvPicPr>
+          <p:cNvPr id="3" name="Picture 2">
+            <a:extLst>
+              <a:ext uri="{FF2B5EF4-FFF2-40B4-BE49-F238E27FC236}">
+                <a16:creationId xmlns:a16="http://schemas.microsoft.com/office/drawing/2014/main" id="{5DDD33F5-951E-2240-ACCE-CF2794F6B7D7}"/>
+              </a:ext>
+            </a:extLst>
+          </p:cNvPr>
+          <p:cNvPicPr>
+            <a:picLocks noChangeAspect="1"/>
+          </p:cNvPicPr>
+          <p:nvPr/>
+        </p:nvPicPr>
+        <p:blipFill>
+          <a:blip r:embed="rId2"/>
+          <a:stretch>
+            <a:fillRect/>
+          </a:stretch>
+        </p:blipFill>
+        <p:spPr>
+          <a:xfrm>
+            <a:off x="0" y="1352550"/>
+            <a:ext cx="8394700" cy="4152900"/>
+          </a:xfrm>
+          <a:prstGeom prst="rect">
+            <a:avLst/>
+          </a:prstGeom>
+        </p:spPr>
+      </p:pic>
     </p:spTree>
     <p:extLst>
       <p:ext uri="{BB962C8B-B14F-4D97-AF65-F5344CB8AC3E}">
-        <p14:creationId xmlns:p14="http://schemas.microsoft.com/office/powerpoint/2010/main" val="2172144522"/>
+        <p14:creationId xmlns:p14="http://schemas.microsoft.com/office/powerpoint/2010/main" val="1212188149"/>
       </p:ext>
     </p:extLst>
   </p:cSld>
@@ -4576,52 +4481,22 @@
           </a:p>
         </p:txBody>
       </p:sp>
-      <p:pic>
-        <p:nvPicPr>
-          <p:cNvPr id="5" name="Picture 4">
-            <a:extLst>
-              <a:ext uri="{FF2B5EF4-FFF2-40B4-BE49-F238E27FC236}">
-                <a16:creationId xmlns:a16="http://schemas.microsoft.com/office/drawing/2014/main" id="{A8BAA6F4-0BE7-1A4A-A640-BF68AA6BC74D}"/>
-              </a:ext>
-            </a:extLst>
-          </p:cNvPr>
-          <p:cNvPicPr>
-            <a:picLocks noChangeAspect="1"/>
-          </p:cNvPicPr>
+      <p:sp>
+        <p:nvSpPr>
+          <p:cNvPr id="6" name="TextBox 5">
+            <a:extLst>
+              <a:ext uri="{FF2B5EF4-FFF2-40B4-BE49-F238E27FC236}">
+                <a16:creationId xmlns:a16="http://schemas.microsoft.com/office/drawing/2014/main" id="{B37EFEE9-A1BD-B84E-82E9-73936C9D61F9}"/>
+              </a:ext>
+            </a:extLst>
+          </p:cNvPr>
+          <p:cNvSpPr txBox="1"/>
           <p:nvPr/>
-        </p:nvPicPr>
-        <p:blipFill>
-          <a:blip r:embed="rId2"/>
-          <a:stretch>
-            <a:fillRect/>
-          </a:stretch>
-        </p:blipFill>
+        </p:nvSpPr>
         <p:spPr>
           <a:xfrm>
-            <a:off x="0" y="1352549"/>
-            <a:ext cx="8394700" cy="4152900"/>
-          </a:xfrm>
-          <a:prstGeom prst="rect">
-            <a:avLst/>
-          </a:prstGeom>
-        </p:spPr>
-      </p:pic>
-      <p:sp>
-        <p:nvSpPr>
-          <p:cNvPr id="6" name="TextBox 5">
-            <a:extLst>
-              <a:ext uri="{FF2B5EF4-FFF2-40B4-BE49-F238E27FC236}">
-                <a16:creationId xmlns:a16="http://schemas.microsoft.com/office/drawing/2014/main" id="{B37EFEE9-A1BD-B84E-82E9-73936C9D61F9}"/>
-              </a:ext>
-            </a:extLst>
-          </p:cNvPr>
-          <p:cNvSpPr txBox="1"/>
-          <p:nvPr/>
-        </p:nvSpPr>
-        <p:spPr>
-          <a:xfrm>
-            <a:off x="0" y="6488668"/>
-            <a:ext cx="10913052" cy="369332"/>
+            <a:off x="0" y="6221549"/>
+            <a:ext cx="10970760" cy="646331"/>
           </a:xfrm>
           <a:prstGeom prst="rect">
             <a:avLst/>
@@ -4636,7 +4511,13 @@
           <a:p>
             <a:r>
               <a:rPr lang="en-US" dirty="0"/>
-              <a:t>Note: the graph is divided into four quadrants, sectioned off by Average Conversion Rate (x) and Average Spend (y)</a:t>
+              <a:t>Note: the graph is divided into four quadrants, sectioned off by Average Conversion Rate (x) and Average Spend (y).</a:t>
+            </a:r>
+          </a:p>
+          <a:p>
+            <a:r>
+              <a:rPr lang="en-US" dirty="0"/>
+              <a:t> The size of each colored point corresponds to number of purchases made there.</a:t>
             </a:r>
           </a:p>
         </p:txBody>
@@ -4657,8 +4538,8 @@
         </p:nvSpPr>
         <p:spPr>
           <a:xfrm>
-            <a:off x="8394700" y="365125"/>
-            <a:ext cx="3429438" cy="6123542"/>
+            <a:off x="8394700" y="1651570"/>
+            <a:ext cx="3429438" cy="3554860"/>
           </a:xfrm>
           <a:prstGeom prst="rect">
             <a:avLst/>
@@ -4837,67 +4718,12 @@
               <a:buNone/>
             </a:pPr>
             <a:r>
-              <a:rPr lang="en-US" sz="1400" dirty="0">
+              <a:rPr lang="en-US" sz="1900" dirty="0">
                 <a:solidFill>
                   <a:srgbClr val="FF0000"/>
                 </a:solidFill>
               </a:rPr>
-              <a:t>Low Conversion Rate, High Spend: </a:t>
-            </a:r>
-          </a:p>
-          <a:p>
-            <a:r>
-              <a:rPr lang="en-US" sz="1400" dirty="0">
-                <a:solidFill>
-                  <a:srgbClr val="FF0000"/>
-                </a:solidFill>
-              </a:rPr>
-              <a:t>Willow TV</a:t>
-            </a:r>
-          </a:p>
-          <a:p>
-            <a:r>
-              <a:rPr lang="en-US" sz="1400" dirty="0" err="1">
-                <a:solidFill>
-                  <a:srgbClr val="FF0000"/>
-                </a:solidFill>
-              </a:rPr>
-              <a:t>ZeeTV</a:t>
-            </a:r>
-            <a:endParaRPr lang="en-US" sz="1400" dirty="0">
-              <a:solidFill>
-                <a:srgbClr val="FF0000"/>
-              </a:solidFill>
-            </a:endParaRPr>
-          </a:p>
-          <a:p>
-            <a:r>
-              <a:rPr lang="en-US" sz="1400" dirty="0">
-                <a:solidFill>
-                  <a:srgbClr val="FF0000"/>
-                </a:solidFill>
-              </a:rPr>
-              <a:t>One America News Network</a:t>
-            </a:r>
-          </a:p>
-          <a:p>
-            <a:r>
-              <a:rPr lang="en-US" sz="1400" dirty="0">
-                <a:solidFill>
-                  <a:srgbClr val="FF0000"/>
-                </a:solidFill>
-              </a:rPr>
-              <a:t>Dateline</a:t>
-            </a:r>
-          </a:p>
-          <a:p>
-            <a:r>
-              <a:rPr lang="en-US" sz="1400" dirty="0">
-                <a:solidFill>
-                  <a:srgbClr val="FF0000"/>
-                </a:solidFill>
-              </a:rPr>
-              <a:t>Star Plus</a:t>
+              <a:t>Low conversion rate, high spend: </a:t>
             </a:r>
           </a:p>
           <a:p>
@@ -4905,7 +4731,7 @@
               <a:buNone/>
             </a:pPr>
             <a:r>
-              <a:rPr lang="en-US" sz="1400" dirty="0">
+              <a:rPr lang="en-US" sz="1900" dirty="0">
                 <a:solidFill>
                   <a:srgbClr val="FF0000"/>
                 </a:solidFill>
@@ -4917,93 +4743,23 @@
             <a:pPr marL="0" indent="0">
               <a:buNone/>
             </a:pPr>
-            <a:r>
-              <a:rPr lang="en-US" sz="1400" dirty="0">
+            <a:endParaRPr lang="en-US" sz="1900" dirty="0">
+              <a:solidFill>
+                <a:srgbClr val="00B050"/>
+              </a:solidFill>
+            </a:endParaRPr>
+          </a:p>
+          <a:p>
+            <a:pPr marL="0" indent="0">
+              <a:buNone/>
+            </a:pPr>
+            <a:r>
+              <a:rPr lang="en-US" sz="1900" dirty="0">
                 <a:solidFill>
                   <a:srgbClr val="00B050"/>
                 </a:solidFill>
               </a:rPr>
-              <a:t>High Conversion Rate, Low Spend: </a:t>
-            </a:r>
-          </a:p>
-          <a:p>
-            <a:r>
-              <a:rPr lang="en-US" sz="1400" dirty="0">
-                <a:solidFill>
-                  <a:srgbClr val="00B050"/>
-                </a:solidFill>
-              </a:rPr>
-              <a:t>CNBC</a:t>
-            </a:r>
-          </a:p>
-          <a:p>
-            <a:r>
-              <a:rPr lang="en-US" sz="1400" dirty="0">
-                <a:solidFill>
-                  <a:srgbClr val="00B050"/>
-                </a:solidFill>
-              </a:rPr>
-              <a:t>Science</a:t>
-            </a:r>
-          </a:p>
-          <a:p>
-            <a:r>
-              <a:rPr lang="en-US" sz="1400" dirty="0">
-                <a:solidFill>
-                  <a:srgbClr val="00B050"/>
-                </a:solidFill>
-              </a:rPr>
-              <a:t>Turner Network TV</a:t>
-            </a:r>
-          </a:p>
-          <a:p>
-            <a:r>
-              <a:rPr lang="en-US" sz="1400" dirty="0">
-                <a:solidFill>
-                  <a:srgbClr val="00B050"/>
-                </a:solidFill>
-              </a:rPr>
-              <a:t>Comedy Central</a:t>
-            </a:r>
-          </a:p>
-          <a:p>
-            <a:r>
-              <a:rPr lang="en-US" sz="1400" dirty="0">
-                <a:solidFill>
-                  <a:srgbClr val="00B050"/>
-                </a:solidFill>
-              </a:rPr>
-              <a:t>NFL Network</a:t>
-            </a:r>
-          </a:p>
-          <a:p>
-            <a:r>
-              <a:rPr lang="en-US" sz="1400" dirty="0">
-                <a:solidFill>
-                  <a:srgbClr val="00B050"/>
-                </a:solidFill>
-              </a:rPr>
-              <a:t>The History Channel</a:t>
-            </a:r>
-          </a:p>
-          <a:p>
-            <a:r>
-              <a:rPr lang="en-US" sz="1400" dirty="0">
-                <a:solidFill>
-                  <a:srgbClr val="00B050"/>
-                </a:solidFill>
-              </a:rPr>
-              <a:t>MSNBC</a:t>
-            </a:r>
-          </a:p>
-          <a:p>
-            <a:r>
-              <a:rPr lang="en-US" sz="1400" dirty="0">
-                <a:solidFill>
-                  <a:srgbClr val="00B050"/>
-                </a:solidFill>
-              </a:rPr>
-              <a:t>Spectrum Sports</a:t>
+              <a:t>High conversion rate, low spend: </a:t>
             </a:r>
           </a:p>
           <a:p>
@@ -5011,7 +4767,7 @@
               <a:buNone/>
             </a:pPr>
             <a:r>
-              <a:rPr lang="en-US" sz="1400" dirty="0">
+              <a:rPr lang="en-US" sz="1900" dirty="0">
                 <a:solidFill>
                   <a:srgbClr val="00B050"/>
                 </a:solidFill>
@@ -5020,10 +4776,40 @@
             </a:r>
           </a:p>
           <a:p>
-            <a:endParaRPr lang="en-US" sz="1400" dirty="0"/>
-          </a:p>
-        </p:txBody>
-      </p:sp>
+            <a:endParaRPr lang="en-US" sz="1900" dirty="0"/>
+          </a:p>
+        </p:txBody>
+      </p:sp>
+      <p:pic>
+        <p:nvPicPr>
+          <p:cNvPr id="3" name="Picture 2">
+            <a:extLst>
+              <a:ext uri="{FF2B5EF4-FFF2-40B4-BE49-F238E27FC236}">
+                <a16:creationId xmlns:a16="http://schemas.microsoft.com/office/drawing/2014/main" id="{256FD139-7692-1A4A-AE14-65645D3AF0E4}"/>
+              </a:ext>
+            </a:extLst>
+          </p:cNvPr>
+          <p:cNvPicPr>
+            <a:picLocks noChangeAspect="1"/>
+          </p:cNvPicPr>
+          <p:nvPr/>
+        </p:nvPicPr>
+        <p:blipFill>
+          <a:blip r:embed="rId2"/>
+          <a:stretch>
+            <a:fillRect/>
+          </a:stretch>
+        </p:blipFill>
+        <p:spPr>
+          <a:xfrm>
+            <a:off x="0" y="1352550"/>
+            <a:ext cx="8394700" cy="4152900"/>
+          </a:xfrm>
+          <a:prstGeom prst="rect">
+            <a:avLst/>
+          </a:prstGeom>
+        </p:spPr>
+      </p:pic>
     </p:spTree>
     <p:extLst>
       <p:ext uri="{BB962C8B-B14F-4D97-AF65-F5344CB8AC3E}">
@@ -5089,52 +4875,22 @@
           </a:p>
         </p:txBody>
       </p:sp>
-      <p:pic>
-        <p:nvPicPr>
-          <p:cNvPr id="5" name="Picture 4">
-            <a:extLst>
-              <a:ext uri="{FF2B5EF4-FFF2-40B4-BE49-F238E27FC236}">
-                <a16:creationId xmlns:a16="http://schemas.microsoft.com/office/drawing/2014/main" id="{85D9EAE6-95A4-3849-92CC-6E039E88E54D}"/>
-              </a:ext>
-            </a:extLst>
-          </p:cNvPr>
-          <p:cNvPicPr>
-            <a:picLocks noChangeAspect="1"/>
-          </p:cNvPicPr>
+      <p:sp>
+        <p:nvSpPr>
+          <p:cNvPr id="6" name="TextBox 5">
+            <a:extLst>
+              <a:ext uri="{FF2B5EF4-FFF2-40B4-BE49-F238E27FC236}">
+                <a16:creationId xmlns:a16="http://schemas.microsoft.com/office/drawing/2014/main" id="{C698CBE9-94FC-4E4A-98B5-3EA97F234890}"/>
+              </a:ext>
+            </a:extLst>
+          </p:cNvPr>
+          <p:cNvSpPr txBox="1"/>
           <p:nvPr/>
-        </p:nvPicPr>
-        <p:blipFill>
-          <a:blip r:embed="rId2"/>
-          <a:stretch>
-            <a:fillRect/>
-          </a:stretch>
-        </p:blipFill>
+        </p:nvSpPr>
         <p:spPr>
           <a:xfrm>
-            <a:off x="0" y="1497541"/>
-            <a:ext cx="8540945" cy="3862917"/>
-          </a:xfrm>
-          <a:prstGeom prst="rect">
-            <a:avLst/>
-          </a:prstGeom>
-        </p:spPr>
-      </p:pic>
-      <p:sp>
-        <p:nvSpPr>
-          <p:cNvPr id="6" name="TextBox 5">
-            <a:extLst>
-              <a:ext uri="{FF2B5EF4-FFF2-40B4-BE49-F238E27FC236}">
-                <a16:creationId xmlns:a16="http://schemas.microsoft.com/office/drawing/2014/main" id="{C698CBE9-94FC-4E4A-98B5-3EA97F234890}"/>
-              </a:ext>
-            </a:extLst>
-          </p:cNvPr>
-          <p:cNvSpPr txBox="1"/>
-          <p:nvPr/>
-        </p:nvSpPr>
-        <p:spPr>
-          <a:xfrm>
-            <a:off x="0" y="6488668"/>
-            <a:ext cx="10684463" cy="369332"/>
+            <a:off x="0" y="6211669"/>
+            <a:ext cx="10795071" cy="646331"/>
           </a:xfrm>
           <a:prstGeom prst="rect">
             <a:avLst/>
@@ -5149,7 +4905,13 @@
           <a:p>
             <a:r>
               <a:rPr lang="en-US" dirty="0"/>
-              <a:t>Note: the graph is divided into four quadrants, sectioned off by Average Conversion Rate (x) and Average CPA (y)</a:t>
+              <a:t>Note: the graph is divided into four quadrants, sectioned off by Average Conversion Rate (x) and Average CPA (y). </a:t>
+            </a:r>
+          </a:p>
+          <a:p>
+            <a:r>
+              <a:rPr lang="en-US" dirty="0"/>
+              <a:t>The size of each colored point corresponds to number of purchases made there.</a:t>
             </a:r>
           </a:p>
         </p:txBody>
@@ -5170,8 +4932,8 @@
         </p:nvSpPr>
         <p:spPr>
           <a:xfrm>
-            <a:off x="8539216" y="1088874"/>
-            <a:ext cx="3429438" cy="5399794"/>
+            <a:off x="8861524" y="1497540"/>
+            <a:ext cx="3250968" cy="3862918"/>
           </a:xfrm>
           <a:prstGeom prst="rect">
             <a:avLst/>
@@ -5350,57 +5112,12 @@
               <a:buNone/>
             </a:pPr>
             <a:r>
-              <a:rPr lang="en-US" sz="1400" dirty="0">
+              <a:rPr lang="en-US" sz="1900" dirty="0">
                 <a:solidFill>
                   <a:srgbClr val="FF0000"/>
                 </a:solidFill>
               </a:rPr>
-              <a:t>Low Conversion Rate, High Cost Per Acquisition</a:t>
-            </a:r>
-          </a:p>
-          <a:p>
-            <a:r>
-              <a:rPr lang="en-US" sz="1400" dirty="0" err="1">
-                <a:solidFill>
-                  <a:srgbClr val="FF0000"/>
-                </a:solidFill>
-              </a:rPr>
-              <a:t>ZeeTV</a:t>
-            </a:r>
-            <a:endParaRPr lang="en-US" sz="1400" dirty="0">
-              <a:solidFill>
-                <a:srgbClr val="FF0000"/>
-              </a:solidFill>
-            </a:endParaRPr>
-          </a:p>
-          <a:p>
-            <a:r>
-              <a:rPr lang="en-US" sz="1400" dirty="0">
-                <a:solidFill>
-                  <a:srgbClr val="FF0000"/>
-                </a:solidFill>
-              </a:rPr>
-              <a:t>Star Plus</a:t>
-            </a:r>
-          </a:p>
-          <a:p>
-            <a:r>
-              <a:rPr lang="en-US" sz="1400" dirty="0">
-                <a:solidFill>
-                  <a:srgbClr val="FF0000"/>
-                </a:solidFill>
-              </a:rPr>
-              <a:t>Bloomberg</a:t>
-            </a:r>
-          </a:p>
-          <a:p>
-            <a:r>
-              <a:rPr lang="en-US" sz="1400" dirty="0">
-                <a:solidFill>
-                  <a:srgbClr val="FF0000"/>
-                </a:solidFill>
-              </a:rPr>
-              <a:t>Fox Sports</a:t>
+              <a:t>Low conversion rate, high cost per acquisition</a:t>
             </a:r>
           </a:p>
           <a:p>
@@ -5408,7 +5125,7 @@
               <a:buNone/>
             </a:pPr>
             <a:r>
-              <a:rPr lang="en-US" sz="1400" dirty="0">
+              <a:rPr lang="en-US" sz="1900" dirty="0">
                 <a:solidFill>
                   <a:srgbClr val="FF0000"/>
                 </a:solidFill>
@@ -5420,63 +5137,23 @@
             <a:pPr marL="0" indent="0">
               <a:buNone/>
             </a:pPr>
-            <a:r>
-              <a:rPr lang="en-US" sz="1400" dirty="0">
+            <a:endParaRPr lang="en-US" sz="1900" dirty="0">
+              <a:solidFill>
+                <a:srgbClr val="00B050"/>
+              </a:solidFill>
+            </a:endParaRPr>
+          </a:p>
+          <a:p>
+            <a:pPr marL="0" indent="0">
+              <a:buNone/>
+            </a:pPr>
+            <a:r>
+              <a:rPr lang="en-US" sz="1900" dirty="0">
                 <a:solidFill>
                   <a:srgbClr val="00B050"/>
                 </a:solidFill>
               </a:rPr>
-              <a:t>High Conversion Rate, Low Cost Per Acquisition</a:t>
-            </a:r>
-          </a:p>
-          <a:p>
-            <a:r>
-              <a:rPr lang="en-US" sz="1400" dirty="0">
-                <a:solidFill>
-                  <a:srgbClr val="00B050"/>
-                </a:solidFill>
-              </a:rPr>
-              <a:t>CNBC</a:t>
-            </a:r>
-          </a:p>
-          <a:p>
-            <a:r>
-              <a:rPr lang="en-US" sz="1400" dirty="0">
-                <a:solidFill>
-                  <a:srgbClr val="00B050"/>
-                </a:solidFill>
-              </a:rPr>
-              <a:t>Turner Network TV</a:t>
-            </a:r>
-          </a:p>
-          <a:p>
-            <a:r>
-              <a:rPr lang="en-US" sz="1400" dirty="0">
-                <a:solidFill>
-                  <a:srgbClr val="00B050"/>
-                </a:solidFill>
-              </a:rPr>
-              <a:t>CNN</a:t>
-            </a:r>
-          </a:p>
-          <a:p>
-            <a:r>
-              <a:rPr lang="en-US" sz="1400" dirty="0">
-                <a:solidFill>
-                  <a:srgbClr val="00B050"/>
-                </a:solidFill>
-              </a:rPr>
-              <a:t>The History Channel</a:t>
-            </a:r>
-          </a:p>
-          <a:p>
-            <a:r>
-              <a:rPr lang="en-US" sz="1400" dirty="0">
-                <a:solidFill>
-                  <a:srgbClr val="00B050"/>
-                </a:solidFill>
-              </a:rPr>
-              <a:t>NFL Network</a:t>
+              <a:t>High conversion rate, low cost per acquisition</a:t>
             </a:r>
           </a:p>
           <a:p>
@@ -5484,7 +5161,7 @@
               <a:buNone/>
             </a:pPr>
             <a:r>
-              <a:rPr lang="en-US" sz="1400" dirty="0">
+              <a:rPr lang="en-US" sz="1900" dirty="0">
                 <a:solidFill>
                   <a:srgbClr val="00B050"/>
                 </a:solidFill>
@@ -5496,7 +5173,7 @@
             <a:pPr marL="0" indent="0">
               <a:buNone/>
             </a:pPr>
-            <a:endParaRPr lang="en-US" sz="1400" dirty="0">
+            <a:endParaRPr lang="en-US" sz="1900" dirty="0">
               <a:solidFill>
                 <a:srgbClr val="FF0000"/>
               </a:solidFill>
@@ -5504,6 +5181,36 @@
           </a:p>
         </p:txBody>
       </p:sp>
+      <p:pic>
+        <p:nvPicPr>
+          <p:cNvPr id="3" name="Picture 2">
+            <a:extLst>
+              <a:ext uri="{FF2B5EF4-FFF2-40B4-BE49-F238E27FC236}">
+                <a16:creationId xmlns:a16="http://schemas.microsoft.com/office/drawing/2014/main" id="{1FF0A1C9-7B75-414C-8D60-0E5F4A9E1F78}"/>
+              </a:ext>
+            </a:extLst>
+          </p:cNvPr>
+          <p:cNvPicPr>
+            <a:picLocks noChangeAspect="1"/>
+          </p:cNvPicPr>
+          <p:nvPr/>
+        </p:nvPicPr>
+        <p:blipFill>
+          <a:blip r:embed="rId2"/>
+          <a:stretch>
+            <a:fillRect/>
+          </a:stretch>
+        </p:blipFill>
+        <p:spPr>
+          <a:xfrm>
+            <a:off x="0" y="1425045"/>
+            <a:ext cx="8861524" cy="4007909"/>
+          </a:xfrm>
+          <a:prstGeom prst="rect">
+            <a:avLst/>
+          </a:prstGeom>
+        </p:spPr>
+      </p:pic>
     </p:spTree>
     <p:extLst>
       <p:ext uri="{BB962C8B-B14F-4D97-AF65-F5344CB8AC3E}">
@@ -5569,52 +5276,22 @@
           </a:p>
         </p:txBody>
       </p:sp>
-      <p:pic>
-        <p:nvPicPr>
-          <p:cNvPr id="5" name="Picture 4">
-            <a:extLst>
-              <a:ext uri="{FF2B5EF4-FFF2-40B4-BE49-F238E27FC236}">
-                <a16:creationId xmlns:a16="http://schemas.microsoft.com/office/drawing/2014/main" id="{BBDF7482-0334-2B49-A01A-E08BEF0909E3}"/>
-              </a:ext>
-            </a:extLst>
-          </p:cNvPr>
-          <p:cNvPicPr>
-            <a:picLocks noChangeAspect="1"/>
-          </p:cNvPicPr>
+      <p:sp>
+        <p:nvSpPr>
+          <p:cNvPr id="6" name="TextBox 5">
+            <a:extLst>
+              <a:ext uri="{FF2B5EF4-FFF2-40B4-BE49-F238E27FC236}">
+                <a16:creationId xmlns:a16="http://schemas.microsoft.com/office/drawing/2014/main" id="{2A0665B8-3BAF-174B-950B-35F0347D5573}"/>
+              </a:ext>
+            </a:extLst>
+          </p:cNvPr>
+          <p:cNvSpPr txBox="1"/>
           <p:nvPr/>
-        </p:nvPicPr>
-        <p:blipFill>
-          <a:blip r:embed="rId2"/>
-          <a:stretch>
-            <a:fillRect/>
-          </a:stretch>
-        </p:blipFill>
+        </p:nvSpPr>
         <p:spPr>
           <a:xfrm>
-            <a:off x="0" y="1514475"/>
-            <a:ext cx="8149905" cy="3829050"/>
-          </a:xfrm>
-          <a:prstGeom prst="rect">
-            <a:avLst/>
-          </a:prstGeom>
-        </p:spPr>
-      </p:pic>
-      <p:sp>
-        <p:nvSpPr>
-          <p:cNvPr id="6" name="TextBox 5">
-            <a:extLst>
-              <a:ext uri="{FF2B5EF4-FFF2-40B4-BE49-F238E27FC236}">
-                <a16:creationId xmlns:a16="http://schemas.microsoft.com/office/drawing/2014/main" id="{2A0665B8-3BAF-174B-950B-35F0347D5573}"/>
-              </a:ext>
-            </a:extLst>
-          </p:cNvPr>
-          <p:cNvSpPr txBox="1"/>
-          <p:nvPr/>
-        </p:nvSpPr>
-        <p:spPr>
-          <a:xfrm>
-            <a:off x="0" y="6488668"/>
-            <a:ext cx="11674671" cy="369332"/>
+            <a:off x="0" y="6232303"/>
+            <a:ext cx="11812529" cy="646331"/>
           </a:xfrm>
           <a:prstGeom prst="rect">
             <a:avLst/>
@@ -5629,7 +5306,13 @@
           <a:p>
             <a:r>
               <a:rPr lang="en-US" dirty="0"/>
-              <a:t>Note: the graph is divided into four quadrants, sectioned off by Average Conversion Rate (x) and Average Cost Per Visitor (y)</a:t>
+              <a:t>Note: the graph is divided into four quadrants, sectioned off by Average Conversion Rate (x) and Average Cost Per Visitor (y).</a:t>
+            </a:r>
+          </a:p>
+          <a:p>
+            <a:r>
+              <a:rPr lang="en-US" dirty="0"/>
+              <a:t> The size of each colored point corresponds to number of purchases made there.</a:t>
             </a:r>
           </a:p>
         </p:txBody>
@@ -5650,8 +5333,8 @@
         </p:nvSpPr>
         <p:spPr>
           <a:xfrm>
-            <a:off x="8245233" y="920677"/>
-            <a:ext cx="3429438" cy="5016646"/>
+            <a:off x="8861240" y="1217576"/>
+            <a:ext cx="3308720" cy="4422848"/>
           </a:xfrm>
           <a:prstGeom prst="rect">
             <a:avLst/>
@@ -5830,64 +5513,12 @@
               <a:buNone/>
             </a:pPr>
             <a:r>
-              <a:rPr lang="en-US" sz="1400" dirty="0">
+              <a:rPr lang="en-US" sz="1900" dirty="0">
                 <a:solidFill>
                   <a:srgbClr val="FF0000"/>
                 </a:solidFill>
               </a:rPr>
-              <a:t>Low Conversion Rate, High Cost Per Visitor:</a:t>
-            </a:r>
-          </a:p>
-          <a:p>
-            <a:r>
-              <a:rPr lang="en-US" sz="1400" dirty="0">
-                <a:solidFill>
-                  <a:srgbClr val="FF0000"/>
-                </a:solidFill>
-              </a:rPr>
-              <a:t>The Weather Channel</a:t>
-            </a:r>
-          </a:p>
-          <a:p>
-            <a:pPr lvl="1"/>
-            <a:r>
-              <a:rPr lang="en-US" sz="1400" dirty="0">
-                <a:solidFill>
-                  <a:srgbClr val="FF0000"/>
-                </a:solidFill>
-              </a:rPr>
-              <a:t>No Purchases</a:t>
-            </a:r>
-          </a:p>
-          <a:p>
-            <a:r>
-              <a:rPr lang="en-US" sz="1400" dirty="0">
-                <a:solidFill>
-                  <a:srgbClr val="FF0000"/>
-                </a:solidFill>
-              </a:rPr>
-              <a:t>CNBC World</a:t>
-            </a:r>
-          </a:p>
-          <a:p>
-            <a:pPr lvl="1"/>
-            <a:r>
-              <a:rPr lang="en-US" sz="1400" dirty="0">
-                <a:solidFill>
-                  <a:srgbClr val="FF0000"/>
-                </a:solidFill>
-              </a:rPr>
-              <a:t>No Purchases</a:t>
-            </a:r>
-          </a:p>
-          <a:p>
-            <a:r>
-              <a:rPr lang="en-US" sz="1400" dirty="0">
-                <a:solidFill>
-                  <a:srgbClr val="FF0000"/>
-                </a:solidFill>
-              </a:rPr>
-              <a:t>Bloomberg</a:t>
+              <a:t>Low conversion rate, high cost per visitor:</a:t>
             </a:r>
           </a:p>
           <a:p>
@@ -5895,7 +5526,7 @@
               <a:buNone/>
             </a:pPr>
             <a:r>
-              <a:rPr lang="en-US" sz="1400" dirty="0">
+              <a:rPr lang="en-US" sz="1900" dirty="0">
                 <a:solidFill>
                   <a:srgbClr val="FF0000"/>
                 </a:solidFill>
@@ -5907,53 +5538,23 @@
             <a:pPr marL="0" indent="0">
               <a:buNone/>
             </a:pPr>
-            <a:r>
-              <a:rPr lang="en-US" sz="1400" dirty="0">
+            <a:endParaRPr lang="en-US" sz="1900" dirty="0">
+              <a:solidFill>
+                <a:srgbClr val="00B050"/>
+              </a:solidFill>
+            </a:endParaRPr>
+          </a:p>
+          <a:p>
+            <a:pPr marL="0" indent="0">
+              <a:buNone/>
+            </a:pPr>
+            <a:r>
+              <a:rPr lang="en-US" sz="1900" dirty="0">
                 <a:solidFill>
                   <a:srgbClr val="00B050"/>
                 </a:solidFill>
               </a:rPr>
-              <a:t>High Conversion Rate, Low Cost Per Visitor: Good!</a:t>
-            </a:r>
-          </a:p>
-          <a:p>
-            <a:r>
-              <a:rPr lang="en-US" sz="1400" dirty="0">
-                <a:solidFill>
-                  <a:srgbClr val="00B050"/>
-                </a:solidFill>
-              </a:rPr>
-              <a:t>CNBC</a:t>
-            </a:r>
-          </a:p>
-          <a:p>
-            <a:r>
-              <a:rPr lang="en-US" sz="1400" dirty="0">
-                <a:solidFill>
-                  <a:srgbClr val="00B050"/>
-                </a:solidFill>
-              </a:rPr>
-              <a:t>CNN</a:t>
-            </a:r>
-          </a:p>
-          <a:p>
-            <a:r>
-              <a:rPr lang="en-US" sz="1400" dirty="0">
-                <a:solidFill>
-                  <a:srgbClr val="00B050"/>
-                </a:solidFill>
-              </a:rPr>
-              <a:t>The History Channel</a:t>
-            </a:r>
-          </a:p>
-          <a:p>
-            <a:r>
-              <a:rPr lang="en-US" sz="1400" dirty="0">
-                <a:solidFill>
-                  <a:srgbClr val="00B050"/>
-                </a:solidFill>
-              </a:rPr>
-              <a:t>MSNBC</a:t>
+              <a:t>High conversion rate, low cost per visitor:</a:t>
             </a:r>
           </a:p>
           <a:p>
@@ -5961,7 +5562,7 @@
               <a:buNone/>
             </a:pPr>
             <a:r>
-              <a:rPr lang="en-US" sz="1400" dirty="0">
+              <a:rPr lang="en-US" sz="1900" dirty="0">
                 <a:solidFill>
                   <a:srgbClr val="00B050"/>
                 </a:solidFill>
@@ -5971,6 +5572,36 @@
           </a:p>
         </p:txBody>
       </p:sp>
+      <p:pic>
+        <p:nvPicPr>
+          <p:cNvPr id="3" name="Picture 2">
+            <a:extLst>
+              <a:ext uri="{FF2B5EF4-FFF2-40B4-BE49-F238E27FC236}">
+                <a16:creationId xmlns:a16="http://schemas.microsoft.com/office/drawing/2014/main" id="{D6B50822-B5A9-9242-94F5-43A7C2481DBC}"/>
+              </a:ext>
+            </a:extLst>
+          </p:cNvPr>
+          <p:cNvPicPr>
+            <a:picLocks noChangeAspect="1"/>
+          </p:cNvPicPr>
+          <p:nvPr/>
+        </p:nvPicPr>
+        <p:blipFill>
+          <a:blip r:embed="rId2"/>
+          <a:stretch>
+            <a:fillRect/>
+          </a:stretch>
+        </p:blipFill>
+        <p:spPr>
+          <a:xfrm>
+            <a:off x="22040" y="1352550"/>
+            <a:ext cx="8839200" cy="4152900"/>
+          </a:xfrm>
+          <a:prstGeom prst="rect">
+            <a:avLst/>
+          </a:prstGeom>
+        </p:spPr>
+      </p:pic>
     </p:spTree>
     <p:extLst>
       <p:ext uri="{BB962C8B-B14F-4D97-AF65-F5344CB8AC3E}">
@@ -6082,7 +5713,7 @@
         <p:spPr>
           <a:xfrm>
             <a:off x="8873067" y="1414562"/>
-            <a:ext cx="2480733" cy="5078313"/>
+            <a:ext cx="2480733" cy="4801314"/>
           </a:xfrm>
           <a:prstGeom prst="rect">
             <a:avLst/>
@@ -6122,7 +5753,7 @@
             </a:r>
             <a:r>
               <a:rPr lang="en-US" dirty="0"/>
-              <a:t> Colors and HGTV, performed better than average, if we look at all purchases attributed to any channel from the exit survey (30 channels).</a:t>
+              <a:t> Colors and HGTV, performed better than average, if we look average over any channel from the exit survey (30 channels).</a:t>
             </a:r>
           </a:p>
         </p:txBody>
@@ -6214,17 +5845,14 @@
           </a:bodyPr>
           <a:lstStyle/>
           <a:p>
-            <a:pPr marL="0" indent="0">
-              <a:buNone/>
-            </a:pPr>
-            <a:r>
-              <a:rPr lang="en-US" u="sng" dirty="0"/>
+            <a:pPr marL="0" indent="0" algn="ctr">
+              <a:buNone/>
+            </a:pPr>
+            <a:r>
+              <a:rPr lang="en-US" sz="3400" u="sng" dirty="0"/>
               <a:t>The good</a:t>
             </a:r>
-            <a:r>
-              <a:rPr lang="en-US" dirty="0"/>
-              <a:t>:</a:t>
-            </a:r>
+            <a:endParaRPr lang="en-US" sz="3400" dirty="0"/>
           </a:p>
           <a:p>
             <a:r>
@@ -6501,18 +6129,15 @@
             </a:lvl9pPr>
           </a:lstStyle>
           <a:p>
-            <a:pPr marL="0" indent="0">
-              <a:buFont typeface="Arial" panose="020B0604020202020204" pitchFamily="34" charset="0"/>
-              <a:buNone/>
-            </a:pPr>
-            <a:r>
-              <a:rPr lang="en-US" u="sng" dirty="0"/>
+            <a:pPr marL="0" indent="0" algn="ctr">
+              <a:buFont typeface="Arial" panose="020B0604020202020204" pitchFamily="34" charset="0"/>
+              <a:buNone/>
+            </a:pPr>
+            <a:r>
+              <a:rPr lang="en-US" sz="2600" u="sng" dirty="0"/>
               <a:t>The bad</a:t>
             </a:r>
-            <a:r>
-              <a:rPr lang="en-US" dirty="0"/>
-              <a:t>:</a:t>
-            </a:r>
+            <a:endParaRPr lang="en-US" sz="2600" dirty="0"/>
           </a:p>
           <a:p>
             <a:r>
@@ -6656,6 +6281,10 @@
           </a:bodyPr>
           <a:lstStyle/>
           <a:p>
+            <a:pPr marL="514350" indent="-514350">
+              <a:buFont typeface="+mj-lt"/>
+              <a:buAutoNum type="arabicPeriod"/>
+            </a:pPr>
             <a:r>
               <a:rPr lang="en-US" dirty="0"/>
               <a:t>MSNBC</a:t>
@@ -6690,6 +6319,10 @@
             </a:r>
           </a:p>
           <a:p>
+            <a:pPr marL="514350" indent="-514350">
+              <a:buFont typeface="+mj-lt"/>
+              <a:buAutoNum type="arabicPeriod"/>
+            </a:pPr>
             <a:r>
               <a:rPr lang="en-US" dirty="0"/>
               <a:t>CNN</a:t>
@@ -6717,6 +6350,10 @@
             </a:r>
           </a:p>
           <a:p>
+            <a:pPr marL="514350" indent="-514350">
+              <a:buFont typeface="+mj-lt"/>
+              <a:buAutoNum type="arabicPeriod"/>
+            </a:pPr>
             <a:r>
               <a:rPr lang="en-US" dirty="0"/>
               <a:t>CNBC</a:t>
@@ -6781,7 +6418,7 @@
         <p:spPr>
           <a:xfrm>
             <a:off x="6096000" y="1582340"/>
-            <a:ext cx="5257800" cy="4524315"/>
+            <a:ext cx="5257800" cy="4678204"/>
           </a:xfrm>
           <a:prstGeom prst="rect">
             <a:avLst/>
@@ -6794,9 +6431,10 @@
           </a:bodyPr>
           <a:lstStyle/>
           <a:p>
-            <a:r>
-              <a:rPr lang="en-US" dirty="0"/>
-              <a:t>Honorable Mentions – </a:t>
+            <a:pPr algn="ctr"/>
+            <a:r>
+              <a:rPr lang="en-US" sz="2800" dirty="0"/>
+              <a:t>Honorable Mentions</a:t>
             </a:r>
           </a:p>
           <a:p>
@@ -6861,7 +6499,7 @@
             </a:pPr>
             <a:r>
               <a:rPr lang="en-US" dirty="0"/>
-              <a:t>Fox News (5.9)</a:t>
+              <a:t>Fox News (5.9%)</a:t>
             </a:r>
           </a:p>
           <a:p>
@@ -6985,80 +6623,65 @@
           </a:bodyPr>
           <a:lstStyle/>
           <a:p>
-            <a:r>
-              <a:rPr lang="en-US" dirty="0"/>
-              <a:t>Comedy Central</a:t>
+            <a:pPr marL="514350" indent="-514350">
+              <a:buFont typeface="+mj-lt"/>
+              <a:buAutoNum type="arabicPeriod"/>
+            </a:pPr>
+            <a:r>
+              <a:rPr lang="en-US" dirty="0"/>
+              <a:t>CNBC World</a:t>
             </a:r>
           </a:p>
           <a:p>
             <a:pPr lvl="1"/>
             <a:r>
               <a:rPr lang="en-US" dirty="0"/>
-              <a:t>Costliest for generating lift</a:t>
+              <a:t>Zero Purchases</a:t>
             </a:r>
           </a:p>
           <a:p>
             <a:pPr lvl="1"/>
             <a:r>
               <a:rPr lang="en-US" dirty="0"/>
-              <a:t>Second costliest in generating purchases</a:t>
+              <a:t>Ranked in bottom 5 for 2/3 of your metrics</a:t>
+            </a:r>
+          </a:p>
+          <a:p>
+            <a:pPr marL="514350" indent="-514350">
+              <a:buFont typeface="+mj-lt"/>
+              <a:buAutoNum type="arabicPeriod"/>
+            </a:pPr>
+            <a:r>
+              <a:rPr lang="en-US" dirty="0"/>
+              <a:t>The Weather Channel</a:t>
             </a:r>
           </a:p>
           <a:p>
             <a:pPr lvl="1"/>
             <a:r>
               <a:rPr lang="en-US" dirty="0"/>
-              <a:t>Ranked in bottom 5 for 2/3 of your metrics</a:t>
-            </a:r>
-          </a:p>
-          <a:p>
-            <a:r>
-              <a:rPr lang="en-US" dirty="0"/>
-              <a:t>CNBC World</a:t>
+              <a:t>Zero Purchases</a:t>
             </a:r>
           </a:p>
           <a:p>
             <a:pPr lvl="1"/>
             <a:r>
               <a:rPr lang="en-US" dirty="0"/>
-              <a:t>Zero Purchases</a:t>
+              <a:t>Third costliest in generating lift</a:t>
             </a:r>
           </a:p>
           <a:p>
             <a:pPr lvl="1"/>
             <a:r>
               <a:rPr lang="en-US" dirty="0"/>
-              <a:t>Ranked in bottom 5 for 2/3 of your metrics</a:t>
-            </a:r>
-          </a:p>
-          <a:p>
-            <a:r>
-              <a:rPr lang="en-US" dirty="0"/>
-              <a:t>The Weather Channel</a:t>
-            </a:r>
-          </a:p>
-          <a:p>
-            <a:pPr lvl="1"/>
-            <a:r>
-              <a:rPr lang="en-US" dirty="0"/>
-              <a:t>Zero Purchases</a:t>
-            </a:r>
-          </a:p>
-          <a:p>
-            <a:pPr lvl="1"/>
-            <a:r>
-              <a:rPr lang="en-US" dirty="0"/>
-              <a:t>Third costliest in generating lift</a:t>
-            </a:r>
-          </a:p>
-          <a:p>
-            <a:pPr lvl="1"/>
-            <a:r>
-              <a:rPr lang="en-US" dirty="0"/>
               <a:t>Ranked in bottom 5 for 3/3 of your metrics</a:t>
             </a:r>
           </a:p>
           <a:p>
+            <a:pPr marL="514350" indent="-514350">
+              <a:buFont typeface="+mj-lt"/>
+              <a:buAutoNum type="arabicPeriod"/>
+            </a:pPr>
             <a:r>
               <a:rPr lang="en-US" dirty="0" err="1"/>
               <a:t>ZeeTV</a:t>
@@ -7073,6 +6696,10 @@
             </a:r>
           </a:p>
           <a:p>
+            <a:pPr marL="514350" indent="-514350">
+              <a:buFont typeface="+mj-lt"/>
+              <a:buAutoNum type="arabicPeriod"/>
+            </a:pPr>
             <a:r>
               <a:rPr lang="en-US" dirty="0"/>
               <a:t>Star Plus</a:t>
@@ -7084,6 +6711,41 @@
               <a:rPr lang="en-US" dirty="0"/>
               <a:t>Performed poorly in 4/6 of the scatter plots</a:t>
             </a:r>
+          </a:p>
+          <a:p>
+            <a:pPr marL="514350" indent="-514350">
+              <a:buFont typeface="+mj-lt"/>
+              <a:buAutoNum type="arabicPeriod"/>
+            </a:pPr>
+            <a:r>
+              <a:rPr lang="en-US" dirty="0"/>
+              <a:t>Comedy Central</a:t>
+            </a:r>
+          </a:p>
+          <a:p>
+            <a:pPr lvl="1"/>
+            <a:r>
+              <a:rPr lang="en-US" dirty="0"/>
+              <a:t>Costliest for generating lift</a:t>
+            </a:r>
+          </a:p>
+          <a:p>
+            <a:pPr lvl="1"/>
+            <a:r>
+              <a:rPr lang="en-US" dirty="0"/>
+              <a:t>Second costliest in generating purchases</a:t>
+            </a:r>
+          </a:p>
+          <a:p>
+            <a:pPr lvl="1"/>
+            <a:r>
+              <a:rPr lang="en-US" dirty="0"/>
+              <a:t>Ranked in bottom 5 for 2/3 of your metrics</a:t>
+            </a:r>
+          </a:p>
+          <a:p>
+            <a:pPr lvl="1"/>
+            <a:endParaRPr lang="en-US" dirty="0"/>
           </a:p>
         </p:txBody>
       </p:sp>
@@ -7102,7 +6764,7 @@
         <p:spPr>
           <a:xfrm>
             <a:off x="6340953" y="1825625"/>
-            <a:ext cx="5012847" cy="923330"/>
+            <a:ext cx="5012847" cy="1077218"/>
           </a:xfrm>
           <a:prstGeom prst="rect">
             <a:avLst/>
@@ -7115,9 +6777,10 @@
           </a:bodyPr>
           <a:lstStyle/>
           <a:p>
-            <a:r>
-              <a:rPr lang="en-US" dirty="0"/>
-              <a:t>Honorable mentions – </a:t>
+            <a:pPr algn="ctr"/>
+            <a:r>
+              <a:rPr lang="en-US" sz="2800" dirty="0"/>
+              <a:t>Honorable mentions</a:t>
             </a:r>
           </a:p>
           <a:p>
@@ -7236,7 +6899,7 @@
             <a:pPr lvl="1"/>
             <a:r>
               <a:rPr lang="en-US" dirty="0"/>
-              <a:t>On average, it cost $10.81 to bring one visitor to your website</a:t>
+              <a:t>On average, it cost $10.81 to bring one visitor to your website.</a:t>
             </a:r>
           </a:p>
           <a:p>
@@ -7336,40 +6999,200 @@
             <p:ph type="title"/>
           </p:nvPr>
         </p:nvSpPr>
-        <p:spPr/>
-        <p:txBody>
-          <a:bodyPr/>
+        <p:spPr>
+          <a:xfrm>
+            <a:off x="3801143" y="324986"/>
+            <a:ext cx="8390857" cy="815445"/>
+          </a:xfrm>
+        </p:spPr>
+        <p:txBody>
+          <a:bodyPr>
+            <a:normAutofit/>
+          </a:bodyPr>
           <a:lstStyle/>
           <a:p>
             <a:r>
-              <a:rPr lang="en-US" dirty="0"/>
+              <a:rPr lang="en-US" sz="4000" u="sng" dirty="0"/>
               <a:t>How can the exit survey be improved?</a:t>
             </a:r>
           </a:p>
         </p:txBody>
       </p:sp>
-      <p:sp>
-        <p:nvSpPr>
-          <p:cNvPr id="3" name="Content Placeholder 2">
-            <a:extLst>
-              <a:ext uri="{FF2B5EF4-FFF2-40B4-BE49-F238E27FC236}">
-                <a16:creationId xmlns:a16="http://schemas.microsoft.com/office/drawing/2014/main" id="{448AAE7E-E421-C044-9F25-718A2B3FF13A}"/>
-              </a:ext>
-            </a:extLst>
-          </p:cNvPr>
-          <p:cNvSpPr>
-            <a:spLocks noGrp="1"/>
-          </p:cNvSpPr>
+      <p:pic>
+        <p:nvPicPr>
+          <p:cNvPr id="4" name="Content Placeholder 3">
+            <a:extLst>
+              <a:ext uri="{FF2B5EF4-FFF2-40B4-BE49-F238E27FC236}">
+                <a16:creationId xmlns:a16="http://schemas.microsoft.com/office/drawing/2014/main" id="{F723A2AF-352B-984B-96E3-E3AB4F99540E}"/>
+              </a:ext>
+            </a:extLst>
+          </p:cNvPr>
+          <p:cNvPicPr>
+            <a:picLocks noGrp="1" noChangeAspect="1"/>
+          </p:cNvPicPr>
           <p:nvPr>
             <p:ph idx="1"/>
           </p:nvPr>
-        </p:nvSpPr>
-        <p:spPr/>
-        <p:txBody>
-          <a:bodyPr/>
+        </p:nvPicPr>
+        <p:blipFill>
+          <a:blip r:embed="rId2"/>
+          <a:stretch>
+            <a:fillRect/>
+          </a:stretch>
+        </p:blipFill>
+        <p:spPr>
+          <a:xfrm>
+            <a:off x="0" y="27036"/>
+            <a:ext cx="3801143" cy="6803928"/>
+          </a:xfrm>
+          <a:prstGeom prst="rect">
+            <a:avLst/>
+          </a:prstGeom>
+        </p:spPr>
+      </p:pic>
+      <p:sp>
+        <p:nvSpPr>
+          <p:cNvPr id="5" name="TextBox 4">
+            <a:extLst>
+              <a:ext uri="{FF2B5EF4-FFF2-40B4-BE49-F238E27FC236}">
+                <a16:creationId xmlns:a16="http://schemas.microsoft.com/office/drawing/2014/main" id="{57958011-D1B5-6E40-8BAE-CFC5BF12DA6C}"/>
+              </a:ext>
+            </a:extLst>
+          </p:cNvPr>
+          <p:cNvSpPr txBox="1"/>
+          <p:nvPr/>
+        </p:nvSpPr>
+        <p:spPr>
+          <a:xfrm>
+            <a:off x="4025610" y="1443841"/>
+            <a:ext cx="7941923" cy="3970318"/>
+          </a:xfrm>
+          <a:prstGeom prst="rect">
+            <a:avLst/>
+          </a:prstGeom>
+          <a:noFill/>
+        </p:spPr>
+        <p:txBody>
+          <a:bodyPr wrap="square" rtlCol="0">
+            <a:spAutoFit/>
+          </a:bodyPr>
           <a:lstStyle/>
           <a:p>
-            <a:endParaRPr lang="en-US"/>
+            <a:pPr marL="285750" indent="-285750">
+              <a:buFont typeface="Arial" panose="020B0604020202020204" pitchFamily="34" charset="0"/>
+              <a:buChar char="•"/>
+            </a:pPr>
+            <a:r>
+              <a:rPr lang="en-US" dirty="0"/>
+              <a:t>Remove channels that you haven’t spent money on</a:t>
+            </a:r>
+          </a:p>
+          <a:p>
+            <a:pPr marL="742950" lvl="1" indent="-285750">
+              <a:buFont typeface="Arial" panose="020B0604020202020204" pitchFamily="34" charset="0"/>
+              <a:buChar char="•"/>
+            </a:pPr>
+            <a:r>
+              <a:rPr lang="en-US" dirty="0"/>
+              <a:t>CBS Sports</a:t>
+            </a:r>
+          </a:p>
+          <a:p>
+            <a:pPr marL="742950" lvl="1" indent="-285750">
+              <a:buFont typeface="Arial" panose="020B0604020202020204" pitchFamily="34" charset="0"/>
+              <a:buChar char="•"/>
+            </a:pPr>
+            <a:r>
+              <a:rPr lang="en-US" dirty="0"/>
+              <a:t>DIY</a:t>
+            </a:r>
+          </a:p>
+          <a:p>
+            <a:pPr marL="742950" lvl="1" indent="-285750">
+              <a:buFont typeface="Arial" panose="020B0604020202020204" pitchFamily="34" charset="0"/>
+              <a:buChar char="•"/>
+            </a:pPr>
+            <a:r>
+              <a:rPr lang="en-US" dirty="0"/>
+              <a:t>ESPN</a:t>
+            </a:r>
+          </a:p>
+          <a:p>
+            <a:pPr marL="742950" lvl="1" indent="-285750">
+              <a:buFont typeface="Arial" panose="020B0604020202020204" pitchFamily="34" charset="0"/>
+              <a:buChar char="•"/>
+            </a:pPr>
+            <a:r>
+              <a:rPr lang="en-US" dirty="0"/>
+              <a:t>Fox News</a:t>
+            </a:r>
+          </a:p>
+          <a:p>
+            <a:pPr marL="742950" lvl="1" indent="-285750">
+              <a:buFont typeface="Arial" panose="020B0604020202020204" pitchFamily="34" charset="0"/>
+              <a:buChar char="•"/>
+            </a:pPr>
+            <a:r>
+              <a:rPr lang="en-US" dirty="0"/>
+              <a:t>FYI</a:t>
+            </a:r>
+          </a:p>
+          <a:p>
+            <a:pPr marL="742950" lvl="1" indent="-285750">
+              <a:buFont typeface="Arial" panose="020B0604020202020204" pitchFamily="34" charset="0"/>
+              <a:buChar char="•"/>
+            </a:pPr>
+            <a:r>
+              <a:rPr lang="en-US" dirty="0"/>
+              <a:t>HGTV</a:t>
+            </a:r>
+          </a:p>
+          <a:p>
+            <a:pPr marL="742950" lvl="1" indent="-285750">
+              <a:buFont typeface="Arial" panose="020B0604020202020204" pitchFamily="34" charset="0"/>
+              <a:buChar char="•"/>
+            </a:pPr>
+            <a:r>
+              <a:rPr lang="en-US" dirty="0"/>
+              <a:t>Oprah Winfrey Network</a:t>
+            </a:r>
+          </a:p>
+          <a:p>
+            <a:pPr marL="285750" indent="-285750">
+              <a:buFont typeface="Arial" panose="020B0604020202020204" pitchFamily="34" charset="0"/>
+              <a:buChar char="•"/>
+            </a:pPr>
+            <a:r>
+              <a:rPr lang="en-US" dirty="0"/>
+              <a:t>Remove Other:______</a:t>
+            </a:r>
+          </a:p>
+          <a:p>
+            <a:pPr marL="742950" lvl="1" indent="-285750">
+              <a:buFont typeface="Arial" panose="020B0604020202020204" pitchFamily="34" charset="0"/>
+              <a:buChar char="•"/>
+            </a:pPr>
+            <a:r>
+              <a:rPr lang="en-US" dirty="0"/>
+              <a:t>When a customer marks Other, it gives us just as much information as if they had left this question blank.  It’s unnecessary to have two different choices that yield the same information.</a:t>
+            </a:r>
+          </a:p>
+          <a:p>
+            <a:pPr marL="285750" indent="-285750">
+              <a:buFont typeface="Arial" panose="020B0604020202020204" pitchFamily="34" charset="0"/>
+              <a:buChar char="•"/>
+            </a:pPr>
+            <a:r>
+              <a:rPr lang="en-US" dirty="0"/>
+              <a:t>Include a few more questions on demographics, such as age or gender.</a:t>
+            </a:r>
+          </a:p>
+          <a:p>
+            <a:pPr marL="285750" indent="-285750">
+              <a:buFont typeface="Arial" panose="020B0604020202020204" pitchFamily="34" charset="0"/>
+              <a:buChar char="•"/>
+            </a:pPr>
+            <a:endParaRPr lang="en-US" dirty="0"/>
           </a:p>
         </p:txBody>
       </p:sp>
@@ -7947,6 +7770,9 @@
             <a:endParaRPr lang="en-US" dirty="0"/>
           </a:p>
           <a:p>
+            <a:endParaRPr lang="en-US" dirty="0"/>
+          </a:p>
+          <a:p>
             <a:r>
               <a:rPr lang="en-US" b="1" u="sng" dirty="0"/>
               <a:t>Key Benchmark</a:t>
@@ -7961,6 +7787,10 @@
             </a:r>
           </a:p>
           <a:p>
+            <a:pPr marL="285750" indent="-285750">
+              <a:buFont typeface="Arial" panose="020B0604020202020204" pitchFamily="34" charset="0"/>
+              <a:buChar char="•"/>
+            </a:pPr>
             <a:r>
               <a:rPr lang="en-US" dirty="0"/>
               <a:t>Only the top 5 companies (</a:t>
@@ -7973,9 +7803,6 @@
               <a:rPr lang="en-US" dirty="0"/>
               <a:t>) outperformed this metric.</a:t>
             </a:r>
-          </a:p>
-          <a:p>
-            <a:endParaRPr lang="en-US" dirty="0"/>
           </a:p>
           <a:p>
             <a:endParaRPr lang="en-US" dirty="0"/>
@@ -8113,20 +7940,20 @@
         </p:nvSpPr>
         <p:spPr>
           <a:xfrm>
-            <a:off x="192370" y="108278"/>
-            <a:ext cx="11807260" cy="721109"/>
+            <a:off x="0" y="108278"/>
+            <a:ext cx="12192000" cy="721109"/>
           </a:xfrm>
         </p:spPr>
         <p:txBody>
           <a:bodyPr>
-            <a:normAutofit/>
+            <a:normAutofit fontScale="90000"/>
           </a:bodyPr>
           <a:lstStyle/>
           <a:p>
             <a:pPr algn="ctr"/>
             <a:r>
               <a:rPr lang="en-US" sz="3400" b="1" u="sng" dirty="0"/>
-              <a:t>Cost efficiency – Cost Per Acquisition (CPA) (Spend/Purchases)</a:t>
+              <a:t>Cost efficiency – Cost Per Acquisition (CPA) Per Network (Spend/Purchases)</a:t>
             </a:r>
           </a:p>
         </p:txBody>
@@ -8306,6 +8133,10 @@
             </a:r>
           </a:p>
           <a:p>
+            <a:pPr marL="285750" indent="-285750">
+              <a:buFont typeface="Arial" panose="020B0604020202020204" pitchFamily="34" charset="0"/>
+              <a:buChar char="•"/>
+            </a:pPr>
             <a:r>
               <a:rPr lang="en-US" dirty="0"/>
               <a:t>Only the top 5 companies (</a:t>
@@ -8420,7 +8251,7 @@
             <a:pPr algn="ctr"/>
             <a:r>
               <a:rPr lang="en-US" sz="3400" b="1" u="sng" dirty="0"/>
-              <a:t>Conversion Rate (Purchases/Lift)%</a:t>
+              <a:t>Conversion Rate Per Network (Purchases/Lift)%</a:t>
             </a:r>
           </a:p>
         </p:txBody>
@@ -8439,8 +8270,8 @@
         </p:nvSpPr>
         <p:spPr>
           <a:xfrm>
-            <a:off x="6240516" y="6611779"/>
-            <a:ext cx="5951484" cy="246221"/>
+            <a:off x="6380251" y="6611779"/>
+            <a:ext cx="5811749" cy="246221"/>
           </a:xfrm>
           <a:prstGeom prst="rect">
             <a:avLst/>
@@ -8455,7 +8286,7 @@
           <a:p>
             <a:r>
               <a:rPr lang="en-US" sz="1000" dirty="0"/>
-              <a:t>Note: As mentioned earlier, Weather Channel and CNBC World are dead last because both had </a:t>
+              <a:t>Note: Weather Channel and CNBC World are dead last in Conversion Rate because both had </a:t>
             </a:r>
             <a:r>
               <a:rPr lang="en-US" sz="1000" b="1" dirty="0"/>
@@ -8542,7 +8373,7 @@
         </p:nvSpPr>
         <p:spPr>
           <a:xfrm>
-            <a:off x="7439656" y="826265"/>
+            <a:off x="7439656" y="846813"/>
             <a:ext cx="4077796" cy="5632311"/>
           </a:xfrm>
           <a:prstGeom prst="rect">
@@ -8596,6 +8427,10 @@
             </a:r>
           </a:p>
           <a:p>
+            <a:pPr marL="285750" indent="-285750">
+              <a:buFont typeface="Arial" panose="020B0604020202020204" pitchFamily="34" charset="0"/>
+              <a:buChar char="•"/>
+            </a:pPr>
             <a:r>
               <a:rPr lang="en-US" dirty="0"/>
               <a:t>Most companies outperformed this metric.</a:t>
@@ -8746,21 +8581,21 @@
           </a:bodyPr>
           <a:lstStyle/>
           <a:p>
+            <a:pPr marL="0" indent="0" algn="ctr">
+              <a:buNone/>
+            </a:pPr>
+            <a:r>
+              <a:rPr lang="en-US" sz="2600" b="1" u="sng" dirty="0"/>
+              <a:t>The good</a:t>
+            </a:r>
+          </a:p>
+          <a:p>
             <a:pPr marL="0" indent="0">
               <a:buNone/>
             </a:pPr>
             <a:r>
-              <a:rPr lang="en-US" sz="1800" b="1" u="sng" dirty="0"/>
-              <a:t>The good</a:t>
-            </a:r>
-          </a:p>
-          <a:p>
-            <a:pPr marL="0" indent="0">
-              <a:buNone/>
-            </a:pPr>
-            <a:r>
               <a:rPr lang="en-US" sz="1800" dirty="0"/>
-              <a:t>The following channels ranked in top 5 for 2/3 of your metrics:</a:t>
+              <a:t>In the top 5 for 2/3 of your metrics:</a:t>
             </a:r>
           </a:p>
           <a:p>
@@ -8857,7 +8692,7 @@
         <p:spPr>
           <a:xfrm>
             <a:off x="6671732" y="1253331"/>
-            <a:ext cx="4682067" cy="4801314"/>
+            <a:ext cx="4682067" cy="4370427"/>
           </a:xfrm>
           <a:prstGeom prst="rect">
             <a:avLst/>
@@ -8870,92 +8705,104 @@
           </a:bodyPr>
           <a:lstStyle/>
           <a:p>
-            <a:r>
-              <a:rPr lang="en-US" b="1" u="sng" dirty="0"/>
+            <a:pPr algn="ctr"/>
+            <a:r>
+              <a:rPr lang="en-US" sz="2600" b="1" u="sng" dirty="0"/>
               <a:t>The bad</a:t>
             </a:r>
+            <a:endParaRPr lang="en-US" sz="2600" dirty="0"/>
+          </a:p>
+          <a:p>
+            <a:r>
+              <a:rPr lang="en-US" dirty="0"/>
+              <a:t>In the bottom 5 for 2/3 of your metrics:</a:t>
+            </a:r>
+          </a:p>
+          <a:p>
+            <a:pPr marL="285750" indent="-285750">
+              <a:buFont typeface="Arial" panose="020B0604020202020204" pitchFamily="34" charset="0"/>
+              <a:buChar char="•"/>
+            </a:pPr>
+            <a:r>
+              <a:rPr lang="en-US" dirty="0"/>
+              <a:t>Comedy Central (-2/3 metrics)</a:t>
+            </a:r>
+          </a:p>
+          <a:p>
+            <a:pPr marL="742950" lvl="1" indent="-285750">
+              <a:buFont typeface="Arial" panose="020B0604020202020204" pitchFamily="34" charset="0"/>
+              <a:buChar char="•"/>
+            </a:pPr>
+            <a:r>
+              <a:rPr lang="en-US" dirty="0"/>
+              <a:t>Costliest in generating lift</a:t>
+            </a:r>
+          </a:p>
+          <a:p>
+            <a:pPr marL="742950" lvl="1" indent="-285750">
+              <a:buFont typeface="Arial" panose="020B0604020202020204" pitchFamily="34" charset="0"/>
+              <a:buChar char="•"/>
+            </a:pPr>
+            <a:r>
+              <a:rPr lang="en-US" dirty="0"/>
+              <a:t>Second costliest in generating purchases</a:t>
+            </a:r>
+          </a:p>
+          <a:p>
+            <a:pPr marL="742950" lvl="1" indent="-285750">
+              <a:buFont typeface="Arial" panose="020B0604020202020204" pitchFamily="34" charset="0"/>
+              <a:buChar char="•"/>
+            </a:pPr>
+            <a:r>
+              <a:rPr lang="en-US" dirty="0"/>
+              <a:t>Low purchases, but high conversion rate</a:t>
+            </a:r>
+          </a:p>
+          <a:p>
+            <a:pPr marL="285750" indent="-285750">
+              <a:buFont typeface="Arial" panose="020B0604020202020204" pitchFamily="34" charset="0"/>
+              <a:buChar char="•"/>
+            </a:pPr>
+            <a:r>
+              <a:rPr lang="en-US" dirty="0"/>
+              <a:t>CNBC World (-2/3 metrics)</a:t>
+            </a:r>
+          </a:p>
+          <a:p>
+            <a:pPr marL="742950" lvl="1" indent="-285750">
+              <a:buFont typeface="Arial" panose="020B0604020202020204" pitchFamily="34" charset="0"/>
+              <a:buChar char="•"/>
+            </a:pPr>
+            <a:r>
+              <a:rPr lang="en-US" dirty="0"/>
+              <a:t>Zero Purchases</a:t>
+            </a:r>
+          </a:p>
+          <a:p>
+            <a:pPr marL="1200150" lvl="2" indent="-285750">
+              <a:buFont typeface="Arial" panose="020B0604020202020204" pitchFamily="34" charset="0"/>
+              <a:buChar char="•"/>
+            </a:pPr>
+            <a:r>
+              <a:rPr lang="en-US" dirty="0"/>
+              <a:t>CPA can’t be calculated</a:t>
+            </a:r>
+          </a:p>
+          <a:p>
             <a:endParaRPr lang="en-US" dirty="0"/>
           </a:p>
           <a:p>
             <a:r>
               <a:rPr lang="en-US" dirty="0"/>
-              <a:t>The following channels ranked in the bottom 5 for 2/3 of your metrics:</a:t>
-            </a:r>
-          </a:p>
-          <a:p>
-            <a:pPr marL="285750" indent="-285750">
-              <a:buFont typeface="Arial" panose="020B0604020202020204" pitchFamily="34" charset="0"/>
-              <a:buChar char="•"/>
-            </a:pPr>
-            <a:r>
-              <a:rPr lang="en-US" dirty="0"/>
-              <a:t>Comedy Central (-2/3 metrics)</a:t>
-            </a:r>
-          </a:p>
-          <a:p>
-            <a:pPr marL="742950" lvl="1" indent="-285750">
-              <a:buFont typeface="Arial" panose="020B0604020202020204" pitchFamily="34" charset="0"/>
-              <a:buChar char="•"/>
-            </a:pPr>
-            <a:r>
-              <a:rPr lang="en-US" dirty="0"/>
-              <a:t>Costliest in generating lift</a:t>
-            </a:r>
-          </a:p>
-          <a:p>
-            <a:pPr marL="742950" lvl="1" indent="-285750">
-              <a:buFont typeface="Arial" panose="020B0604020202020204" pitchFamily="34" charset="0"/>
-              <a:buChar char="•"/>
-            </a:pPr>
-            <a:r>
-              <a:rPr lang="en-US" dirty="0"/>
-              <a:t>Second costliest in generating purchases</a:t>
-            </a:r>
-          </a:p>
-          <a:p>
-            <a:pPr marL="742950" lvl="1" indent="-285750">
-              <a:buFont typeface="Arial" panose="020B0604020202020204" pitchFamily="34" charset="0"/>
-              <a:buChar char="•"/>
-            </a:pPr>
-            <a:r>
-              <a:rPr lang="en-US" dirty="0"/>
-              <a:t>Despite low purchases, has high conversion rate</a:t>
-            </a:r>
-          </a:p>
-          <a:p>
-            <a:pPr marL="285750" indent="-285750">
-              <a:buFont typeface="Arial" panose="020B0604020202020204" pitchFamily="34" charset="0"/>
-              <a:buChar char="•"/>
-            </a:pPr>
-            <a:r>
-              <a:rPr lang="en-US" dirty="0"/>
-              <a:t>CNBC World (-2/3 metrics)</a:t>
-            </a:r>
-          </a:p>
-          <a:p>
-            <a:pPr marL="742950" lvl="1" indent="-285750">
-              <a:buFont typeface="Arial" panose="020B0604020202020204" pitchFamily="34" charset="0"/>
-              <a:buChar char="•"/>
-            </a:pPr>
-            <a:r>
-              <a:rPr lang="en-US" dirty="0"/>
-              <a:t>Zero Purchases</a:t>
-            </a:r>
-          </a:p>
-          <a:p>
-            <a:pPr marL="1200150" lvl="2" indent="-285750">
-              <a:buFont typeface="Arial" panose="020B0604020202020204" pitchFamily="34" charset="0"/>
-              <a:buChar char="•"/>
-            </a:pPr>
-            <a:r>
-              <a:rPr lang="en-US" dirty="0"/>
-              <a:t>CPA can’t be calculated</a:t>
-            </a:r>
-          </a:p>
-          <a:p>
-            <a:r>
-              <a:rPr lang="en-US" dirty="0"/>
-              <a:t>The following channels ranked in the bottom 5 for all three of your metrics:</a:t>
+              <a:t>In the bottom 5 for </a:t>
+            </a:r>
+            <a:r>
+              <a:rPr lang="en-US" i="1" dirty="0"/>
+              <a:t>all three </a:t>
+            </a:r>
+            <a:r>
+              <a:rPr lang="en-US" dirty="0"/>
+              <a:t>of your metrics:</a:t>
             </a:r>
           </a:p>
           <a:p>

</xml_diff>